<commit_message>
added more diagrams to thesis
</commit_message>
<xml_diff>
--- a/MSc Thesis/images/TipSphere.pptx
+++ b/MSc Thesis/images/TipSphere.pptx
@@ -6,6 +6,9 @@
   </p:sldMasterIdLst>
   <p:sldIdLst>
     <p:sldId id="256" r:id="rId2"/>
+    <p:sldId id="258" r:id="rId3"/>
+    <p:sldId id="259" r:id="rId4"/>
+    <p:sldId id="260" r:id="rId5"/>
   </p:sldIdLst>
   <p:sldSz cx="12192000" cy="6858000"/>
   <p:notesSz cx="6858000" cy="9144000"/>
@@ -104,6 +107,11 @@
       </a:defRPr>
     </a:lvl9pPr>
   </p:defaultTextStyle>
+  <p:extLst>
+    <p:ext uri="{EFAFB233-063F-42B5-8137-9DF3F51BA10A}">
+      <p15:sldGuideLst xmlns:p15="http://schemas.microsoft.com/office/powerpoint/2012/main"/>
+    </p:ext>
+  </p:extLst>
 </p:presentation>
 </file>
 
@@ -238,7 +246,7 @@
           <a:p>
             <a:fld id="{5830AA71-20C6-4B3D-9F8B-0E61A1E3EA63}" type="datetimeFigureOut">
               <a:rPr lang="en-GB" smtClean="0"/>
-              <a:t>07/09/2016</a:t>
+              <a:t>08/09/2016</a:t>
             </a:fld>
             <a:endParaRPr lang="en-GB"/>
           </a:p>
@@ -408,7 +416,7 @@
           <a:p>
             <a:fld id="{5830AA71-20C6-4B3D-9F8B-0E61A1E3EA63}" type="datetimeFigureOut">
               <a:rPr lang="en-GB" smtClean="0"/>
-              <a:t>07/09/2016</a:t>
+              <a:t>08/09/2016</a:t>
             </a:fld>
             <a:endParaRPr lang="en-GB"/>
           </a:p>
@@ -588,7 +596,7 @@
           <a:p>
             <a:fld id="{5830AA71-20C6-4B3D-9F8B-0E61A1E3EA63}" type="datetimeFigureOut">
               <a:rPr lang="en-GB" smtClean="0"/>
-              <a:t>07/09/2016</a:t>
+              <a:t>08/09/2016</a:t>
             </a:fld>
             <a:endParaRPr lang="en-GB"/>
           </a:p>
@@ -758,7 +766,7 @@
           <a:p>
             <a:fld id="{5830AA71-20C6-4B3D-9F8B-0E61A1E3EA63}" type="datetimeFigureOut">
               <a:rPr lang="en-GB" smtClean="0"/>
-              <a:t>07/09/2016</a:t>
+              <a:t>08/09/2016</a:t>
             </a:fld>
             <a:endParaRPr lang="en-GB"/>
           </a:p>
@@ -1004,7 +1012,7 @@
           <a:p>
             <a:fld id="{5830AA71-20C6-4B3D-9F8B-0E61A1E3EA63}" type="datetimeFigureOut">
               <a:rPr lang="en-GB" smtClean="0"/>
-              <a:t>07/09/2016</a:t>
+              <a:t>08/09/2016</a:t>
             </a:fld>
             <a:endParaRPr lang="en-GB"/>
           </a:p>
@@ -1236,7 +1244,7 @@
           <a:p>
             <a:fld id="{5830AA71-20C6-4B3D-9F8B-0E61A1E3EA63}" type="datetimeFigureOut">
               <a:rPr lang="en-GB" smtClean="0"/>
-              <a:t>07/09/2016</a:t>
+              <a:t>08/09/2016</a:t>
             </a:fld>
             <a:endParaRPr lang="en-GB"/>
           </a:p>
@@ -1603,7 +1611,7 @@
           <a:p>
             <a:fld id="{5830AA71-20C6-4B3D-9F8B-0E61A1E3EA63}" type="datetimeFigureOut">
               <a:rPr lang="en-GB" smtClean="0"/>
-              <a:t>07/09/2016</a:t>
+              <a:t>08/09/2016</a:t>
             </a:fld>
             <a:endParaRPr lang="en-GB"/>
           </a:p>
@@ -1721,7 +1729,7 @@
           <a:p>
             <a:fld id="{5830AA71-20C6-4B3D-9F8B-0E61A1E3EA63}" type="datetimeFigureOut">
               <a:rPr lang="en-GB" smtClean="0"/>
-              <a:t>07/09/2016</a:t>
+              <a:t>08/09/2016</a:t>
             </a:fld>
             <a:endParaRPr lang="en-GB"/>
           </a:p>
@@ -1816,7 +1824,7 @@
           <a:p>
             <a:fld id="{5830AA71-20C6-4B3D-9F8B-0E61A1E3EA63}" type="datetimeFigureOut">
               <a:rPr lang="en-GB" smtClean="0"/>
-              <a:t>07/09/2016</a:t>
+              <a:t>08/09/2016</a:t>
             </a:fld>
             <a:endParaRPr lang="en-GB"/>
           </a:p>
@@ -2093,7 +2101,7 @@
           <a:p>
             <a:fld id="{5830AA71-20C6-4B3D-9F8B-0E61A1E3EA63}" type="datetimeFigureOut">
               <a:rPr lang="en-GB" smtClean="0"/>
-              <a:t>07/09/2016</a:t>
+              <a:t>08/09/2016</a:t>
             </a:fld>
             <a:endParaRPr lang="en-GB"/>
           </a:p>
@@ -2346,7 +2354,7 @@
           <a:p>
             <a:fld id="{5830AA71-20C6-4B3D-9F8B-0E61A1E3EA63}" type="datetimeFigureOut">
               <a:rPr lang="en-GB" smtClean="0"/>
-              <a:t>07/09/2016</a:t>
+              <a:t>08/09/2016</a:t>
             </a:fld>
             <a:endParaRPr lang="en-GB"/>
           </a:p>
@@ -2559,7 +2567,7 @@
           <a:p>
             <a:fld id="{5830AA71-20C6-4B3D-9F8B-0E61A1E3EA63}" type="datetimeFigureOut">
               <a:rPr lang="en-GB" smtClean="0"/>
-              <a:t>07/09/2016</a:t>
+              <a:t>08/09/2016</a:t>
             </a:fld>
             <a:endParaRPr lang="en-GB"/>
           </a:p>
@@ -2964,6 +2972,120 @@
           <a:chExt cx="0" cy="0"/>
         </a:xfrm>
       </p:grpSpPr>
+      <p:grpSp>
+        <p:nvGrpSpPr>
+          <p:cNvPr id="2" name="Group 1"/>
+          <p:cNvGrpSpPr/>
+          <p:nvPr/>
+        </p:nvGrpSpPr>
+        <p:grpSpPr>
+          <a:xfrm>
+            <a:off x="3830633" y="312696"/>
+            <a:ext cx="5671389" cy="5566493"/>
+            <a:chOff x="6624633" y="1923288"/>
+            <a:chExt cx="5671389" cy="5566493"/>
+          </a:xfrm>
+        </p:grpSpPr>
+        <p:sp>
+          <p:nvSpPr>
+            <p:cNvPr id="19" name="Oval 18"/>
+            <p:cNvSpPr/>
+            <p:nvPr/>
+          </p:nvSpPr>
+          <p:spPr>
+            <a:xfrm>
+              <a:off x="6624633" y="1923288"/>
+              <a:ext cx="5671389" cy="5566493"/>
+            </a:xfrm>
+            <a:prstGeom prst="ellipse">
+              <a:avLst/>
+            </a:prstGeom>
+            <a:solidFill>
+              <a:schemeClr val="accent1">
+                <a:lumMod val="40000"/>
+                <a:lumOff val="60000"/>
+              </a:schemeClr>
+            </a:solidFill>
+            <a:ln w="22225">
+              <a:noFill/>
+              <a:prstDash val="lgDash"/>
+            </a:ln>
+          </p:spPr>
+          <p:style>
+            <a:lnRef idx="2">
+              <a:schemeClr val="accent1">
+                <a:shade val="50000"/>
+              </a:schemeClr>
+            </a:lnRef>
+            <a:fillRef idx="1">
+              <a:schemeClr val="accent1"/>
+            </a:fillRef>
+            <a:effectRef idx="0">
+              <a:schemeClr val="accent1"/>
+            </a:effectRef>
+            <a:fontRef idx="minor">
+              <a:schemeClr val="lt1"/>
+            </a:fontRef>
+          </p:style>
+          <p:txBody>
+            <a:bodyPr rtlCol="0" anchor="ctr"/>
+            <a:lstStyle/>
+            <a:p>
+              <a:pPr algn="ctr"/>
+              <a:endParaRPr lang="en-GB"/>
+            </a:p>
+          </p:txBody>
+        </p:sp>
+        <p:sp>
+          <p:nvSpPr>
+            <p:cNvPr id="24" name="Oval 23"/>
+            <p:cNvSpPr>
+              <a:spLocks noChangeAspect="1"/>
+            </p:cNvSpPr>
+            <p:nvPr/>
+          </p:nvSpPr>
+          <p:spPr>
+            <a:xfrm>
+              <a:off x="6966194" y="2258534"/>
+              <a:ext cx="4988268" cy="4896000"/>
+            </a:xfrm>
+            <a:prstGeom prst="ellipse">
+              <a:avLst/>
+            </a:prstGeom>
+            <a:solidFill>
+              <a:schemeClr val="bg1"/>
+            </a:solidFill>
+            <a:ln w="22225">
+              <a:noFill/>
+              <a:prstDash val="lgDash"/>
+            </a:ln>
+          </p:spPr>
+          <p:style>
+            <a:lnRef idx="2">
+              <a:schemeClr val="accent1">
+                <a:shade val="50000"/>
+              </a:schemeClr>
+            </a:lnRef>
+            <a:fillRef idx="1">
+              <a:schemeClr val="accent1"/>
+            </a:fillRef>
+            <a:effectRef idx="0">
+              <a:schemeClr val="accent1"/>
+            </a:effectRef>
+            <a:fontRef idx="minor">
+              <a:schemeClr val="lt1"/>
+            </a:fontRef>
+          </p:style>
+          <p:txBody>
+            <a:bodyPr rtlCol="0" anchor="ctr"/>
+            <a:lstStyle/>
+            <a:p>
+              <a:pPr algn="ctr"/>
+              <a:endParaRPr lang="en-GB"/>
+            </a:p>
+          </p:txBody>
+        </p:sp>
+      </p:grpSp>
       <p:sp>
         <p:nvSpPr>
           <p:cNvPr id="9" name="Oval 8"/>
@@ -3029,9 +3151,9 @@
             </a:avLst>
           </a:prstGeom>
           <a:solidFill>
-            <a:schemeClr val="accent1">
-              <a:lumMod val="20000"/>
-              <a:lumOff val="80000"/>
+            <a:schemeClr val="accent6">
+              <a:lumMod val="40000"/>
+              <a:lumOff val="60000"/>
             </a:schemeClr>
           </a:solidFill>
           <a:ln w="19050">
@@ -3474,56 +3596,13 @@
       </p:sp>
       <p:sp>
         <p:nvSpPr>
-          <p:cNvPr id="22" name="Oval 21"/>
-          <p:cNvSpPr/>
-          <p:nvPr/>
-        </p:nvSpPr>
-        <p:spPr>
-          <a:xfrm>
-            <a:off x="2015417" y="3760431"/>
-            <a:ext cx="78242" cy="78048"/>
-          </a:xfrm>
-          <a:prstGeom prst="ellipse">
-            <a:avLst/>
-          </a:prstGeom>
-          <a:ln>
-            <a:noFill/>
-          </a:ln>
-        </p:spPr>
-        <p:style>
-          <a:lnRef idx="2">
-            <a:schemeClr val="accent1">
-              <a:shade val="50000"/>
-            </a:schemeClr>
-          </a:lnRef>
-          <a:fillRef idx="1">
-            <a:schemeClr val="accent1"/>
-          </a:fillRef>
-          <a:effectRef idx="0">
-            <a:schemeClr val="accent1"/>
-          </a:effectRef>
-          <a:fontRef idx="minor">
-            <a:schemeClr val="lt1"/>
-          </a:fontRef>
-        </p:style>
-        <p:txBody>
-          <a:bodyPr rtlCol="0" anchor="ctr"/>
-          <a:lstStyle/>
-          <a:p>
-            <a:pPr algn="ctr"/>
-            <a:endParaRPr lang="en-GB"/>
-          </a:p>
-        </p:txBody>
-      </p:sp>
-      <p:sp>
-        <p:nvSpPr>
           <p:cNvPr id="30" name="TextBox 29"/>
           <p:cNvSpPr txBox="1"/>
           <p:nvPr/>
         </p:nvSpPr>
         <p:spPr>
           <a:xfrm>
-            <a:off x="6489480" y="594885"/>
+            <a:off x="6287854" y="777728"/>
             <a:ext cx="1269929" cy="646331"/>
           </a:xfrm>
           <a:prstGeom prst="rect">
@@ -3563,8 +3642,8 @@
         </p:nvCxnSpPr>
         <p:spPr>
           <a:xfrm flipH="1" flipV="1">
-            <a:off x="5600700" y="740239"/>
-            <a:ext cx="888780" cy="177812"/>
+            <a:off x="5634182" y="737371"/>
+            <a:ext cx="653672" cy="363523"/>
           </a:xfrm>
           <a:prstGeom prst="line">
             <a:avLst/>
@@ -3589,10 +3668,2530 @@
           </a:fontRef>
         </p:style>
       </p:cxnSp>
+      <p:cxnSp>
+        <p:nvCxnSpPr>
+          <p:cNvPr id="48" name="Straight Connector 47"/>
+          <p:cNvCxnSpPr/>
+          <p:nvPr/>
+        </p:nvCxnSpPr>
+        <p:spPr>
+          <a:xfrm flipH="1">
+            <a:off x="5919278" y="5052938"/>
+            <a:ext cx="405392" cy="518661"/>
+          </a:xfrm>
+          <a:prstGeom prst="line">
+            <a:avLst/>
+          </a:prstGeom>
+          <a:ln>
+            <a:headEnd type="none"/>
+            <a:tailEnd type="triangle" w="lg" len="med"/>
+          </a:ln>
+        </p:spPr>
+        <p:style>
+          <a:lnRef idx="1">
+            <a:schemeClr val="accent1"/>
+          </a:lnRef>
+          <a:fillRef idx="0">
+            <a:schemeClr val="accent1"/>
+          </a:fillRef>
+          <a:effectRef idx="0">
+            <a:schemeClr val="accent1"/>
+          </a:effectRef>
+          <a:fontRef idx="minor">
+            <a:schemeClr val="tx1"/>
+          </a:fontRef>
+        </p:style>
+      </p:cxnSp>
+      <p:sp>
+        <p:nvSpPr>
+          <p:cNvPr id="49" name="TextBox 48"/>
+          <p:cNvSpPr txBox="1"/>
+          <p:nvPr/>
+        </p:nvSpPr>
+        <p:spPr>
+          <a:xfrm>
+            <a:off x="6249009" y="4723874"/>
+            <a:ext cx="1866229" cy="646331"/>
+          </a:xfrm>
+          <a:prstGeom prst="rect">
+            <a:avLst/>
+          </a:prstGeom>
+          <a:noFill/>
+        </p:spPr>
+        <p:txBody>
+          <a:bodyPr wrap="square" rtlCol="0">
+            <a:spAutoFit/>
+          </a:bodyPr>
+          <a:lstStyle/>
+          <a:p>
+            <a:r>
+              <a:rPr lang="en-GB" dirty="0" smtClean="0">
+                <a:solidFill>
+                  <a:schemeClr val="accent5"/>
+                </a:solidFill>
+              </a:rPr>
+              <a:t>Not immediately disregarded</a:t>
+            </a:r>
+            <a:endParaRPr lang="en-GB" dirty="0">
+              <a:solidFill>
+                <a:schemeClr val="accent5"/>
+              </a:solidFill>
+            </a:endParaRPr>
+          </a:p>
+        </p:txBody>
+      </p:sp>
+      <p:cxnSp>
+        <p:nvCxnSpPr>
+          <p:cNvPr id="50" name="Straight Connector 49"/>
+          <p:cNvCxnSpPr>
+            <a:endCxn id="5" idx="2"/>
+          </p:cNvCxnSpPr>
+          <p:nvPr/>
+        </p:nvCxnSpPr>
+        <p:spPr>
+          <a:xfrm flipH="1" flipV="1">
+            <a:off x="6766960" y="3090335"/>
+            <a:ext cx="2355498" cy="492708"/>
+          </a:xfrm>
+          <a:prstGeom prst="line">
+            <a:avLst/>
+          </a:prstGeom>
+          <a:ln w="22225">
+            <a:solidFill>
+              <a:schemeClr val="accent6"/>
+            </a:solidFill>
+            <a:headEnd type="triangle" w="lg" len="lg"/>
+            <a:tailEnd type="none" w="lg" len="lg"/>
+          </a:ln>
+        </p:spPr>
+        <p:style>
+          <a:lnRef idx="1">
+            <a:schemeClr val="accent1"/>
+          </a:lnRef>
+          <a:fillRef idx="0">
+            <a:schemeClr val="accent1"/>
+          </a:fillRef>
+          <a:effectRef idx="0">
+            <a:schemeClr val="accent1"/>
+          </a:effectRef>
+          <a:fontRef idx="minor">
+            <a:schemeClr val="tx1"/>
+          </a:fontRef>
+        </p:style>
+      </p:cxnSp>
+      <p:sp>
+        <p:nvSpPr>
+          <p:cNvPr id="51" name="TextBox 50"/>
+          <p:cNvSpPr txBox="1"/>
+          <p:nvPr/>
+        </p:nvSpPr>
+        <p:spPr>
+          <a:xfrm>
+            <a:off x="7405535" y="3261160"/>
+            <a:ext cx="984116" cy="369332"/>
+          </a:xfrm>
+          <a:prstGeom prst="rect">
+            <a:avLst/>
+          </a:prstGeom>
+          <a:noFill/>
+        </p:spPr>
+        <p:txBody>
+          <a:bodyPr wrap="none" rtlCol="0">
+            <a:spAutoFit/>
+          </a:bodyPr>
+          <a:lstStyle/>
+          <a:p>
+            <a:r>
+              <a:rPr lang="en-GB" dirty="0" smtClean="0">
+                <a:solidFill>
+                  <a:schemeClr val="accent6"/>
+                </a:solidFill>
+              </a:rPr>
+              <a:t>R</a:t>
+            </a:r>
+            <a:r>
+              <a:rPr lang="en-GB" baseline="-25000" dirty="0" smtClean="0">
+                <a:solidFill>
+                  <a:schemeClr val="accent6"/>
+                </a:solidFill>
+              </a:rPr>
+              <a:t>minSphere</a:t>
+            </a:r>
+            <a:endParaRPr lang="en-GB" dirty="0">
+              <a:solidFill>
+                <a:schemeClr val="accent6"/>
+              </a:solidFill>
+            </a:endParaRPr>
+          </a:p>
+        </p:txBody>
+      </p:sp>
     </p:spTree>
     <p:extLst>
       <p:ext uri="{BB962C8B-B14F-4D97-AF65-F5344CB8AC3E}">
         <p14:creationId xmlns:p14="http://schemas.microsoft.com/office/powerpoint/2010/main" val="2543191110"/>
+      </p:ext>
+    </p:extLst>
+  </p:cSld>
+  <p:clrMapOvr>
+    <a:masterClrMapping/>
+  </p:clrMapOvr>
+</p:sld>
+</file>
+
+<file path=ppt/slides/slide2.xml><?xml version="1.0" encoding="utf-8"?>
+<p:sld xmlns:a="http://schemas.openxmlformats.org/drawingml/2006/main" xmlns:r="http://schemas.openxmlformats.org/officeDocument/2006/relationships" xmlns:p="http://schemas.openxmlformats.org/presentationml/2006/main">
+  <p:cSld>
+    <p:spTree>
+      <p:nvGrpSpPr>
+        <p:cNvPr id="1" name=""/>
+        <p:cNvGrpSpPr/>
+        <p:nvPr/>
+      </p:nvGrpSpPr>
+      <p:grpSpPr>
+        <a:xfrm>
+          <a:off x="0" y="0"/>
+          <a:ext cx="0" cy="0"/>
+          <a:chOff x="0" y="0"/>
+          <a:chExt cx="0" cy="0"/>
+        </a:xfrm>
+      </p:grpSpPr>
+      <p:grpSp>
+        <p:nvGrpSpPr>
+          <p:cNvPr id="15" name="Group 14"/>
+          <p:cNvGrpSpPr/>
+          <p:nvPr/>
+        </p:nvGrpSpPr>
+        <p:grpSpPr>
+          <a:xfrm>
+            <a:off x="2711903" y="272658"/>
+            <a:ext cx="6977014" cy="5688335"/>
+            <a:chOff x="2711903" y="272658"/>
+            <a:chExt cx="6977014" cy="5688335"/>
+          </a:xfrm>
+        </p:grpSpPr>
+        <p:grpSp>
+          <p:nvGrpSpPr>
+            <p:cNvPr id="2" name="Group 1"/>
+            <p:cNvGrpSpPr/>
+            <p:nvPr/>
+          </p:nvGrpSpPr>
+          <p:grpSpPr>
+            <a:xfrm>
+              <a:off x="3830633" y="312696"/>
+              <a:ext cx="5671389" cy="5566493"/>
+              <a:chOff x="6624633" y="1923288"/>
+              <a:chExt cx="5671389" cy="5566493"/>
+            </a:xfrm>
+          </p:grpSpPr>
+          <p:sp>
+            <p:nvSpPr>
+              <p:cNvPr id="19" name="Oval 18"/>
+              <p:cNvSpPr/>
+              <p:nvPr/>
+            </p:nvSpPr>
+            <p:spPr>
+              <a:xfrm>
+                <a:off x="6624633" y="1923288"/>
+                <a:ext cx="5671389" cy="5566493"/>
+              </a:xfrm>
+              <a:prstGeom prst="ellipse">
+                <a:avLst/>
+              </a:prstGeom>
+              <a:solidFill>
+                <a:schemeClr val="accent1">
+                  <a:lumMod val="40000"/>
+                  <a:lumOff val="60000"/>
+                </a:schemeClr>
+              </a:solidFill>
+              <a:ln w="22225">
+                <a:noFill/>
+                <a:prstDash val="lgDash"/>
+              </a:ln>
+            </p:spPr>
+            <p:style>
+              <a:lnRef idx="2">
+                <a:schemeClr val="accent1">
+                  <a:shade val="50000"/>
+                </a:schemeClr>
+              </a:lnRef>
+              <a:fillRef idx="1">
+                <a:schemeClr val="accent1"/>
+              </a:fillRef>
+              <a:effectRef idx="0">
+                <a:schemeClr val="accent1"/>
+              </a:effectRef>
+              <a:fontRef idx="minor">
+                <a:schemeClr val="lt1"/>
+              </a:fontRef>
+            </p:style>
+            <p:txBody>
+              <a:bodyPr rtlCol="0" anchor="ctr"/>
+              <a:lstStyle/>
+              <a:p>
+                <a:pPr algn="ctr"/>
+                <a:endParaRPr lang="en-GB"/>
+              </a:p>
+            </p:txBody>
+          </p:sp>
+          <p:sp>
+            <p:nvSpPr>
+              <p:cNvPr id="24" name="Oval 23"/>
+              <p:cNvSpPr>
+                <a:spLocks noChangeAspect="1"/>
+              </p:cNvSpPr>
+              <p:nvPr/>
+            </p:nvSpPr>
+            <p:spPr>
+              <a:xfrm>
+                <a:off x="6966194" y="2258534"/>
+                <a:ext cx="4988268" cy="4896000"/>
+              </a:xfrm>
+              <a:prstGeom prst="ellipse">
+                <a:avLst/>
+              </a:prstGeom>
+              <a:solidFill>
+                <a:schemeClr val="bg1"/>
+              </a:solidFill>
+              <a:ln w="22225">
+                <a:noFill/>
+                <a:prstDash val="lgDash"/>
+              </a:ln>
+            </p:spPr>
+            <p:style>
+              <a:lnRef idx="2">
+                <a:schemeClr val="accent1">
+                  <a:shade val="50000"/>
+                </a:schemeClr>
+              </a:lnRef>
+              <a:fillRef idx="1">
+                <a:schemeClr val="accent1"/>
+              </a:fillRef>
+              <a:effectRef idx="0">
+                <a:schemeClr val="accent1"/>
+              </a:effectRef>
+              <a:fontRef idx="minor">
+                <a:schemeClr val="lt1"/>
+              </a:fontRef>
+            </p:style>
+            <p:txBody>
+              <a:bodyPr rtlCol="0" anchor="ctr"/>
+              <a:lstStyle/>
+              <a:p>
+                <a:pPr algn="ctr"/>
+                <a:endParaRPr lang="en-GB"/>
+              </a:p>
+            </p:txBody>
+          </p:sp>
+        </p:grpSp>
+        <p:sp>
+          <p:nvSpPr>
+            <p:cNvPr id="9" name="Oval 8"/>
+            <p:cNvSpPr/>
+            <p:nvPr/>
+          </p:nvSpPr>
+          <p:spPr>
+            <a:xfrm>
+              <a:off x="3835468" y="311794"/>
+              <a:ext cx="5671389" cy="5566493"/>
+            </a:xfrm>
+            <a:prstGeom prst="ellipse">
+              <a:avLst/>
+            </a:prstGeom>
+            <a:noFill/>
+            <a:ln w="22225">
+              <a:solidFill>
+                <a:schemeClr val="accent6"/>
+              </a:solidFill>
+              <a:prstDash val="lgDash"/>
+            </a:ln>
+          </p:spPr>
+          <p:style>
+            <a:lnRef idx="2">
+              <a:schemeClr val="accent1">
+                <a:shade val="50000"/>
+              </a:schemeClr>
+            </a:lnRef>
+            <a:fillRef idx="1">
+              <a:schemeClr val="accent1"/>
+            </a:fillRef>
+            <a:effectRef idx="0">
+              <a:schemeClr val="accent1"/>
+            </a:effectRef>
+            <a:fontRef idx="minor">
+              <a:schemeClr val="lt1"/>
+            </a:fontRef>
+          </p:style>
+          <p:txBody>
+            <a:bodyPr rtlCol="0" anchor="ctr"/>
+            <a:lstStyle/>
+            <a:p>
+              <a:pPr algn="ctr"/>
+              <a:endParaRPr lang="en-GB"/>
+            </a:p>
+          </p:txBody>
+        </p:sp>
+        <p:sp>
+          <p:nvSpPr>
+            <p:cNvPr id="34" name="Pie 33"/>
+            <p:cNvSpPr/>
+            <p:nvPr/>
+          </p:nvSpPr>
+          <p:spPr>
+            <a:xfrm rot="10632034">
+              <a:off x="3831113" y="272658"/>
+              <a:ext cx="5857804" cy="5688335"/>
+            </a:xfrm>
+            <a:prstGeom prst="pie">
+              <a:avLst>
+                <a:gd name="adj1" fmla="val 0"/>
+                <a:gd name="adj2" fmla="val 4494618"/>
+              </a:avLst>
+            </a:prstGeom>
+            <a:solidFill>
+              <a:schemeClr val="accent6">
+                <a:lumMod val="40000"/>
+                <a:lumOff val="60000"/>
+              </a:schemeClr>
+            </a:solidFill>
+            <a:ln w="19050">
+              <a:prstDash val="lgDash"/>
+            </a:ln>
+          </p:spPr>
+          <p:style>
+            <a:lnRef idx="2">
+              <a:schemeClr val="accent1">
+                <a:shade val="50000"/>
+              </a:schemeClr>
+            </a:lnRef>
+            <a:fillRef idx="1">
+              <a:schemeClr val="accent1"/>
+            </a:fillRef>
+            <a:effectRef idx="0">
+              <a:schemeClr val="accent1"/>
+            </a:effectRef>
+            <a:fontRef idx="minor">
+              <a:schemeClr val="lt1"/>
+            </a:fontRef>
+          </p:style>
+          <p:txBody>
+            <a:bodyPr rtlCol="0" anchor="ctr"/>
+            <a:lstStyle/>
+            <a:p>
+              <a:pPr algn="ctr"/>
+              <a:endParaRPr lang="en-GB">
+                <a:solidFill>
+                  <a:schemeClr val="tx1"/>
+                </a:solidFill>
+              </a:endParaRPr>
+            </a:p>
+          </p:txBody>
+        </p:sp>
+        <p:sp>
+          <p:nvSpPr>
+            <p:cNvPr id="35" name="Pie 34"/>
+            <p:cNvSpPr/>
+            <p:nvPr/>
+          </p:nvSpPr>
+          <p:spPr>
+            <a:xfrm rot="10632034">
+              <a:off x="4184834" y="606763"/>
+              <a:ext cx="5127122" cy="5020124"/>
+            </a:xfrm>
+            <a:prstGeom prst="pie">
+              <a:avLst>
+                <a:gd name="adj1" fmla="val 20428"/>
+                <a:gd name="adj2" fmla="val 4494618"/>
+              </a:avLst>
+            </a:prstGeom>
+            <a:solidFill>
+              <a:schemeClr val="bg1"/>
+            </a:solidFill>
+            <a:ln w="19050">
+              <a:noFill/>
+              <a:prstDash val="lgDash"/>
+            </a:ln>
+          </p:spPr>
+          <p:style>
+            <a:lnRef idx="2">
+              <a:schemeClr val="accent1">
+                <a:shade val="50000"/>
+              </a:schemeClr>
+            </a:lnRef>
+            <a:fillRef idx="1">
+              <a:schemeClr val="accent1"/>
+            </a:fillRef>
+            <a:effectRef idx="0">
+              <a:schemeClr val="accent1"/>
+            </a:effectRef>
+            <a:fontRef idx="minor">
+              <a:schemeClr val="lt1"/>
+            </a:fontRef>
+          </p:style>
+          <p:txBody>
+            <a:bodyPr rtlCol="0" anchor="ctr"/>
+            <a:lstStyle/>
+            <a:p>
+              <a:pPr algn="ctr"/>
+              <a:endParaRPr lang="en-GB">
+                <a:solidFill>
+                  <a:schemeClr val="tx1"/>
+                </a:solidFill>
+              </a:endParaRPr>
+            </a:p>
+          </p:txBody>
+        </p:sp>
+        <p:grpSp>
+          <p:nvGrpSpPr>
+            <p:cNvPr id="10" name="Group 9"/>
+            <p:cNvGrpSpPr/>
+            <p:nvPr/>
+          </p:nvGrpSpPr>
+          <p:grpSpPr>
+            <a:xfrm>
+              <a:off x="4131211" y="2119085"/>
+              <a:ext cx="3503304" cy="1963226"/>
+              <a:chOff x="3579667" y="2409755"/>
+              <a:chExt cx="4872811" cy="2761128"/>
+            </a:xfrm>
+          </p:grpSpPr>
+          <p:sp>
+            <p:nvSpPr>
+              <p:cNvPr id="4" name="Rectangle 3"/>
+              <p:cNvSpPr/>
+              <p:nvPr/>
+            </p:nvSpPr>
+            <p:spPr>
+              <a:xfrm rot="2052924">
+                <a:off x="3579667" y="2409755"/>
+                <a:ext cx="3985147" cy="477672"/>
+              </a:xfrm>
+              <a:prstGeom prst="rect">
+                <a:avLst/>
+              </a:prstGeom>
+            </p:spPr>
+            <p:style>
+              <a:lnRef idx="2">
+                <a:schemeClr val="accent1">
+                  <a:shade val="50000"/>
+                </a:schemeClr>
+              </a:lnRef>
+              <a:fillRef idx="1">
+                <a:schemeClr val="accent1"/>
+              </a:fillRef>
+              <a:effectRef idx="0">
+                <a:schemeClr val="accent1"/>
+              </a:effectRef>
+              <a:fontRef idx="minor">
+                <a:schemeClr val="lt1"/>
+              </a:fontRef>
+            </p:style>
+            <p:txBody>
+              <a:bodyPr rtlCol="0" anchor="ctr"/>
+              <a:lstStyle/>
+              <a:p>
+                <a:pPr algn="ctr"/>
+                <a:endParaRPr lang="en-GB"/>
+              </a:p>
+            </p:txBody>
+          </p:sp>
+          <p:grpSp>
+            <p:nvGrpSpPr>
+              <p:cNvPr id="8" name="Group 7"/>
+              <p:cNvGrpSpPr/>
+              <p:nvPr/>
+            </p:nvGrpSpPr>
+            <p:grpSpPr>
+              <a:xfrm rot="18266766">
+                <a:off x="6736673" y="3455079"/>
+                <a:ext cx="2064579" cy="1367030"/>
+                <a:chOff x="6432308" y="4442018"/>
+                <a:chExt cx="2064579" cy="1367030"/>
+              </a:xfrm>
+            </p:grpSpPr>
+            <p:sp>
+              <p:nvSpPr>
+                <p:cNvPr id="5" name="Rectangle 4"/>
+                <p:cNvSpPr/>
+                <p:nvPr/>
+              </p:nvSpPr>
+              <p:spPr>
+                <a:xfrm>
+                  <a:off x="6432308" y="4445391"/>
+                  <a:ext cx="2064579" cy="45719"/>
+                </a:xfrm>
+                <a:prstGeom prst="rect">
+                  <a:avLst/>
+                </a:prstGeom>
+              </p:spPr>
+              <p:style>
+                <a:lnRef idx="2">
+                  <a:schemeClr val="accent1">
+                    <a:shade val="50000"/>
+                  </a:schemeClr>
+                </a:lnRef>
+                <a:fillRef idx="1">
+                  <a:schemeClr val="accent1"/>
+                </a:fillRef>
+                <a:effectRef idx="0">
+                  <a:schemeClr val="accent1"/>
+                </a:effectRef>
+                <a:fontRef idx="minor">
+                  <a:schemeClr val="lt1"/>
+                </a:fontRef>
+              </p:style>
+              <p:txBody>
+                <a:bodyPr rtlCol="0" anchor="ctr"/>
+                <a:lstStyle/>
+                <a:p>
+                  <a:pPr algn="ctr"/>
+                  <a:endParaRPr lang="en-GB"/>
+                </a:p>
+              </p:txBody>
+            </p:sp>
+            <p:sp>
+              <p:nvSpPr>
+                <p:cNvPr id="6" name="Rectangle 5"/>
+                <p:cNvSpPr/>
+                <p:nvPr/>
+              </p:nvSpPr>
+              <p:spPr>
+                <a:xfrm rot="5400000" flipV="1">
+                  <a:off x="5801118" y="5078126"/>
+                  <a:ext cx="1317936" cy="45719"/>
+                </a:xfrm>
+                <a:prstGeom prst="rect">
+                  <a:avLst/>
+                </a:prstGeom>
+              </p:spPr>
+              <p:style>
+                <a:lnRef idx="2">
+                  <a:schemeClr val="accent1">
+                    <a:shade val="50000"/>
+                  </a:schemeClr>
+                </a:lnRef>
+                <a:fillRef idx="1">
+                  <a:schemeClr val="accent1"/>
+                </a:fillRef>
+                <a:effectRef idx="0">
+                  <a:schemeClr val="accent1"/>
+                </a:effectRef>
+                <a:fontRef idx="minor">
+                  <a:schemeClr val="lt1"/>
+                </a:fontRef>
+              </p:style>
+              <p:txBody>
+                <a:bodyPr rtlCol="0" anchor="ctr"/>
+                <a:lstStyle/>
+                <a:p>
+                  <a:pPr algn="ctr"/>
+                  <a:endParaRPr lang="en-GB"/>
+                </a:p>
+              </p:txBody>
+            </p:sp>
+            <p:sp>
+              <p:nvSpPr>
+                <p:cNvPr id="7" name="Rectangle 6"/>
+                <p:cNvSpPr/>
+                <p:nvPr/>
+              </p:nvSpPr>
+              <p:spPr>
+                <a:xfrm rot="5400000" flipV="1">
+                  <a:off x="7809002" y="5127220"/>
+                  <a:ext cx="1317936" cy="45719"/>
+                </a:xfrm>
+                <a:prstGeom prst="rect">
+                  <a:avLst/>
+                </a:prstGeom>
+              </p:spPr>
+              <p:style>
+                <a:lnRef idx="2">
+                  <a:schemeClr val="accent1">
+                    <a:shade val="50000"/>
+                  </a:schemeClr>
+                </a:lnRef>
+                <a:fillRef idx="1">
+                  <a:schemeClr val="accent1"/>
+                </a:fillRef>
+                <a:effectRef idx="0">
+                  <a:schemeClr val="accent1"/>
+                </a:effectRef>
+                <a:fontRef idx="minor">
+                  <a:schemeClr val="lt1"/>
+                </a:fontRef>
+              </p:style>
+              <p:txBody>
+                <a:bodyPr rtlCol="0" anchor="ctr"/>
+                <a:lstStyle/>
+                <a:p>
+                  <a:pPr algn="ctr"/>
+                  <a:endParaRPr lang="en-GB"/>
+                </a:p>
+              </p:txBody>
+            </p:sp>
+          </p:grpSp>
+        </p:grpSp>
+        <p:sp>
+          <p:nvSpPr>
+            <p:cNvPr id="20" name="TextBox 19"/>
+            <p:cNvSpPr txBox="1"/>
+            <p:nvPr/>
+          </p:nvSpPr>
+          <p:spPr>
+            <a:xfrm>
+              <a:off x="7415131" y="2366200"/>
+              <a:ext cx="625492" cy="369332"/>
+            </a:xfrm>
+            <a:prstGeom prst="rect">
+              <a:avLst/>
+            </a:prstGeom>
+            <a:noFill/>
+          </p:spPr>
+          <p:txBody>
+            <a:bodyPr wrap="none" rtlCol="0">
+              <a:spAutoFit/>
+            </a:bodyPr>
+            <a:lstStyle/>
+            <a:p>
+              <a:r>
+                <a:rPr lang="en-GB" dirty="0" smtClean="0">
+                  <a:solidFill>
+                    <a:schemeClr val="accent5"/>
+                  </a:solidFill>
+                </a:rPr>
+                <a:t>Base</a:t>
+              </a:r>
+              <a:endParaRPr lang="en-GB" dirty="0">
+                <a:solidFill>
+                  <a:schemeClr val="accent5"/>
+                </a:solidFill>
+              </a:endParaRPr>
+            </a:p>
+          </p:txBody>
+        </p:sp>
+        <p:sp>
+          <p:nvSpPr>
+            <p:cNvPr id="21" name="TextBox 20"/>
+            <p:cNvSpPr txBox="1"/>
+            <p:nvPr/>
+          </p:nvSpPr>
+          <p:spPr>
+            <a:xfrm rot="1974035">
+              <a:off x="5350623" y="2156080"/>
+              <a:ext cx="582211" cy="369332"/>
+            </a:xfrm>
+            <a:prstGeom prst="rect">
+              <a:avLst/>
+            </a:prstGeom>
+            <a:noFill/>
+          </p:spPr>
+          <p:txBody>
+            <a:bodyPr wrap="none" rtlCol="0">
+              <a:spAutoFit/>
+            </a:bodyPr>
+            <a:lstStyle/>
+            <a:p>
+              <a:r>
+                <a:rPr lang="en-GB" dirty="0" smtClean="0">
+                  <a:solidFill>
+                    <a:schemeClr val="bg1"/>
+                  </a:solidFill>
+                </a:rPr>
+                <a:t>Arm</a:t>
+              </a:r>
+              <a:endParaRPr lang="en-GB" dirty="0">
+                <a:solidFill>
+                  <a:schemeClr val="bg1"/>
+                </a:solidFill>
+              </a:endParaRPr>
+            </a:p>
+          </p:txBody>
+        </p:sp>
+        <p:sp>
+          <p:nvSpPr>
+            <p:cNvPr id="3" name="Oval 2"/>
+            <p:cNvSpPr>
+              <a:spLocks noChangeAspect="1"/>
+            </p:cNvSpPr>
+            <p:nvPr/>
+          </p:nvSpPr>
+          <p:spPr>
+            <a:xfrm>
+              <a:off x="2853459" y="4806621"/>
+              <a:ext cx="108000" cy="108000"/>
+            </a:xfrm>
+            <a:prstGeom prst="ellipse">
+              <a:avLst/>
+            </a:prstGeom>
+            <a:solidFill>
+              <a:srgbClr val="FF0000"/>
+            </a:solidFill>
+            <a:ln>
+              <a:solidFill>
+                <a:srgbClr val="FF0000"/>
+              </a:solidFill>
+            </a:ln>
+          </p:spPr>
+          <p:style>
+            <a:lnRef idx="2">
+              <a:schemeClr val="accent1">
+                <a:shade val="50000"/>
+              </a:schemeClr>
+            </a:lnRef>
+            <a:fillRef idx="1">
+              <a:schemeClr val="accent1"/>
+            </a:fillRef>
+            <a:effectRef idx="0">
+              <a:schemeClr val="accent1"/>
+            </a:effectRef>
+            <a:fontRef idx="minor">
+              <a:schemeClr val="lt1"/>
+            </a:fontRef>
+          </p:style>
+          <p:txBody>
+            <a:bodyPr rtlCol="0" anchor="ctr"/>
+            <a:lstStyle/>
+            <a:p>
+              <a:pPr algn="ctr"/>
+              <a:endParaRPr lang="en-GB"/>
+            </a:p>
+          </p:txBody>
+        </p:sp>
+        <p:cxnSp>
+          <p:nvCxnSpPr>
+            <p:cNvPr id="25" name="Straight Connector 24"/>
+            <p:cNvCxnSpPr>
+              <a:stCxn id="3" idx="6"/>
+            </p:cNvCxnSpPr>
+            <p:nvPr/>
+          </p:nvCxnSpPr>
+          <p:spPr>
+            <a:xfrm flipV="1">
+              <a:off x="2961459" y="3087225"/>
+              <a:ext cx="3767887" cy="1773396"/>
+            </a:xfrm>
+            <a:prstGeom prst="line">
+              <a:avLst/>
+            </a:prstGeom>
+            <a:ln w="12700">
+              <a:solidFill>
+                <a:schemeClr val="tx1"/>
+              </a:solidFill>
+              <a:headEnd type="triangle" w="med" len="med"/>
+              <a:tailEnd type="oval" w="lg" len="lg"/>
+            </a:ln>
+          </p:spPr>
+          <p:style>
+            <a:lnRef idx="1">
+              <a:schemeClr val="accent1"/>
+            </a:lnRef>
+            <a:fillRef idx="0">
+              <a:schemeClr val="accent1"/>
+            </a:fillRef>
+            <a:effectRef idx="0">
+              <a:schemeClr val="accent1"/>
+            </a:effectRef>
+            <a:fontRef idx="minor">
+              <a:schemeClr val="tx1"/>
+            </a:fontRef>
+          </p:style>
+        </p:cxnSp>
+        <p:sp>
+          <p:nvSpPr>
+            <p:cNvPr id="29" name="TextBox 28"/>
+            <p:cNvSpPr txBox="1"/>
+            <p:nvPr/>
+          </p:nvSpPr>
+          <p:spPr>
+            <a:xfrm>
+              <a:off x="2711903" y="3973012"/>
+              <a:ext cx="1345751" cy="471422"/>
+            </a:xfrm>
+            <a:prstGeom prst="rect">
+              <a:avLst/>
+            </a:prstGeom>
+            <a:noFill/>
+          </p:spPr>
+          <p:txBody>
+            <a:bodyPr wrap="square" rtlCol="0">
+              <a:spAutoFit/>
+            </a:bodyPr>
+            <a:lstStyle/>
+            <a:p>
+              <a:r>
+                <a:rPr lang="en-GB" sz="1200" dirty="0" smtClean="0">
+                  <a:solidFill>
+                    <a:schemeClr val="accent5"/>
+                  </a:solidFill>
+                </a:rPr>
+                <a:t>Immediately disregarded point</a:t>
+              </a:r>
+              <a:endParaRPr lang="en-GB" sz="1200" dirty="0">
+                <a:solidFill>
+                  <a:schemeClr val="accent5"/>
+                </a:solidFill>
+              </a:endParaRPr>
+            </a:p>
+          </p:txBody>
+        </p:sp>
+      </p:grpSp>
+    </p:spTree>
+    <p:extLst>
+      <p:ext uri="{BB962C8B-B14F-4D97-AF65-F5344CB8AC3E}">
+        <p14:creationId xmlns:p14="http://schemas.microsoft.com/office/powerpoint/2010/main" val="1629630876"/>
+      </p:ext>
+    </p:extLst>
+  </p:cSld>
+  <p:clrMapOvr>
+    <a:masterClrMapping/>
+  </p:clrMapOvr>
+</p:sld>
+</file>
+
+<file path=ppt/slides/slide3.xml><?xml version="1.0" encoding="utf-8"?>
+<p:sld xmlns:a="http://schemas.openxmlformats.org/drawingml/2006/main" xmlns:r="http://schemas.openxmlformats.org/officeDocument/2006/relationships" xmlns:p="http://schemas.openxmlformats.org/presentationml/2006/main">
+  <p:cSld>
+    <p:spTree>
+      <p:nvGrpSpPr>
+        <p:cNvPr id="1" name=""/>
+        <p:cNvGrpSpPr/>
+        <p:nvPr/>
+      </p:nvGrpSpPr>
+      <p:grpSpPr>
+        <a:xfrm>
+          <a:off x="0" y="0"/>
+          <a:ext cx="0" cy="0"/>
+          <a:chOff x="0" y="0"/>
+          <a:chExt cx="0" cy="0"/>
+        </a:xfrm>
+      </p:grpSpPr>
+      <p:grpSp>
+        <p:nvGrpSpPr>
+          <p:cNvPr id="16" name="Group 15"/>
+          <p:cNvGrpSpPr/>
+          <p:nvPr/>
+        </p:nvGrpSpPr>
+        <p:grpSpPr>
+          <a:xfrm>
+            <a:off x="2815394" y="272658"/>
+            <a:ext cx="6873523" cy="5688335"/>
+            <a:chOff x="2815394" y="272658"/>
+            <a:chExt cx="6873523" cy="5688335"/>
+          </a:xfrm>
+        </p:grpSpPr>
+        <p:grpSp>
+          <p:nvGrpSpPr>
+            <p:cNvPr id="2" name="Group 1"/>
+            <p:cNvGrpSpPr/>
+            <p:nvPr/>
+          </p:nvGrpSpPr>
+          <p:grpSpPr>
+            <a:xfrm>
+              <a:off x="3830633" y="312696"/>
+              <a:ext cx="5671389" cy="5566493"/>
+              <a:chOff x="6624633" y="1923288"/>
+              <a:chExt cx="5671389" cy="5566493"/>
+            </a:xfrm>
+          </p:grpSpPr>
+          <p:sp>
+            <p:nvSpPr>
+              <p:cNvPr id="19" name="Oval 18"/>
+              <p:cNvSpPr/>
+              <p:nvPr/>
+            </p:nvSpPr>
+            <p:spPr>
+              <a:xfrm>
+                <a:off x="6624633" y="1923288"/>
+                <a:ext cx="5671389" cy="5566493"/>
+              </a:xfrm>
+              <a:prstGeom prst="ellipse">
+                <a:avLst/>
+              </a:prstGeom>
+              <a:solidFill>
+                <a:schemeClr val="accent1">
+                  <a:lumMod val="40000"/>
+                  <a:lumOff val="60000"/>
+                </a:schemeClr>
+              </a:solidFill>
+              <a:ln w="22225">
+                <a:noFill/>
+                <a:prstDash val="lgDash"/>
+              </a:ln>
+            </p:spPr>
+            <p:style>
+              <a:lnRef idx="2">
+                <a:schemeClr val="accent1">
+                  <a:shade val="50000"/>
+                </a:schemeClr>
+              </a:lnRef>
+              <a:fillRef idx="1">
+                <a:schemeClr val="accent1"/>
+              </a:fillRef>
+              <a:effectRef idx="0">
+                <a:schemeClr val="accent1"/>
+              </a:effectRef>
+              <a:fontRef idx="minor">
+                <a:schemeClr val="lt1"/>
+              </a:fontRef>
+            </p:style>
+            <p:txBody>
+              <a:bodyPr rtlCol="0" anchor="ctr"/>
+              <a:lstStyle/>
+              <a:p>
+                <a:pPr algn="ctr"/>
+                <a:endParaRPr lang="en-GB"/>
+              </a:p>
+            </p:txBody>
+          </p:sp>
+          <p:sp>
+            <p:nvSpPr>
+              <p:cNvPr id="24" name="Oval 23"/>
+              <p:cNvSpPr>
+                <a:spLocks noChangeAspect="1"/>
+              </p:cNvSpPr>
+              <p:nvPr/>
+            </p:nvSpPr>
+            <p:spPr>
+              <a:xfrm>
+                <a:off x="6966194" y="2258534"/>
+                <a:ext cx="4988268" cy="4896000"/>
+              </a:xfrm>
+              <a:prstGeom prst="ellipse">
+                <a:avLst/>
+              </a:prstGeom>
+              <a:solidFill>
+                <a:schemeClr val="bg1"/>
+              </a:solidFill>
+              <a:ln w="22225">
+                <a:noFill/>
+                <a:prstDash val="lgDash"/>
+              </a:ln>
+            </p:spPr>
+            <p:style>
+              <a:lnRef idx="2">
+                <a:schemeClr val="accent1">
+                  <a:shade val="50000"/>
+                </a:schemeClr>
+              </a:lnRef>
+              <a:fillRef idx="1">
+                <a:schemeClr val="accent1"/>
+              </a:fillRef>
+              <a:effectRef idx="0">
+                <a:schemeClr val="accent1"/>
+              </a:effectRef>
+              <a:fontRef idx="minor">
+                <a:schemeClr val="lt1"/>
+              </a:fontRef>
+            </p:style>
+            <p:txBody>
+              <a:bodyPr rtlCol="0" anchor="ctr"/>
+              <a:lstStyle/>
+              <a:p>
+                <a:pPr algn="ctr"/>
+                <a:endParaRPr lang="en-GB"/>
+              </a:p>
+            </p:txBody>
+          </p:sp>
+        </p:grpSp>
+        <p:sp>
+          <p:nvSpPr>
+            <p:cNvPr id="9" name="Oval 8"/>
+            <p:cNvSpPr/>
+            <p:nvPr/>
+          </p:nvSpPr>
+          <p:spPr>
+            <a:xfrm>
+              <a:off x="3835468" y="311794"/>
+              <a:ext cx="5671389" cy="5566493"/>
+            </a:xfrm>
+            <a:prstGeom prst="ellipse">
+              <a:avLst/>
+            </a:prstGeom>
+            <a:noFill/>
+            <a:ln w="22225">
+              <a:solidFill>
+                <a:schemeClr val="accent6"/>
+              </a:solidFill>
+              <a:prstDash val="lgDash"/>
+            </a:ln>
+          </p:spPr>
+          <p:style>
+            <a:lnRef idx="2">
+              <a:schemeClr val="accent1">
+                <a:shade val="50000"/>
+              </a:schemeClr>
+            </a:lnRef>
+            <a:fillRef idx="1">
+              <a:schemeClr val="accent1"/>
+            </a:fillRef>
+            <a:effectRef idx="0">
+              <a:schemeClr val="accent1"/>
+            </a:effectRef>
+            <a:fontRef idx="minor">
+              <a:schemeClr val="lt1"/>
+            </a:fontRef>
+          </p:style>
+          <p:txBody>
+            <a:bodyPr rtlCol="0" anchor="ctr"/>
+            <a:lstStyle/>
+            <a:p>
+              <a:pPr algn="ctr"/>
+              <a:endParaRPr lang="en-GB"/>
+            </a:p>
+          </p:txBody>
+        </p:sp>
+        <p:sp>
+          <p:nvSpPr>
+            <p:cNvPr id="34" name="Pie 33"/>
+            <p:cNvSpPr/>
+            <p:nvPr/>
+          </p:nvSpPr>
+          <p:spPr>
+            <a:xfrm rot="10632034">
+              <a:off x="3831113" y="272658"/>
+              <a:ext cx="5857804" cy="5688335"/>
+            </a:xfrm>
+            <a:prstGeom prst="pie">
+              <a:avLst>
+                <a:gd name="adj1" fmla="val 0"/>
+                <a:gd name="adj2" fmla="val 4494618"/>
+              </a:avLst>
+            </a:prstGeom>
+            <a:solidFill>
+              <a:schemeClr val="accent6">
+                <a:lumMod val="40000"/>
+                <a:lumOff val="60000"/>
+              </a:schemeClr>
+            </a:solidFill>
+            <a:ln w="19050">
+              <a:prstDash val="lgDash"/>
+            </a:ln>
+          </p:spPr>
+          <p:style>
+            <a:lnRef idx="2">
+              <a:schemeClr val="accent1">
+                <a:shade val="50000"/>
+              </a:schemeClr>
+            </a:lnRef>
+            <a:fillRef idx="1">
+              <a:schemeClr val="accent1"/>
+            </a:fillRef>
+            <a:effectRef idx="0">
+              <a:schemeClr val="accent1"/>
+            </a:effectRef>
+            <a:fontRef idx="minor">
+              <a:schemeClr val="lt1"/>
+            </a:fontRef>
+          </p:style>
+          <p:txBody>
+            <a:bodyPr rtlCol="0" anchor="ctr"/>
+            <a:lstStyle/>
+            <a:p>
+              <a:pPr algn="ctr"/>
+              <a:endParaRPr lang="en-GB">
+                <a:solidFill>
+                  <a:schemeClr val="tx1"/>
+                </a:solidFill>
+              </a:endParaRPr>
+            </a:p>
+          </p:txBody>
+        </p:sp>
+        <p:sp>
+          <p:nvSpPr>
+            <p:cNvPr id="35" name="Pie 34"/>
+            <p:cNvSpPr/>
+            <p:nvPr/>
+          </p:nvSpPr>
+          <p:spPr>
+            <a:xfrm rot="10632034">
+              <a:off x="4184834" y="606763"/>
+              <a:ext cx="5127122" cy="5020124"/>
+            </a:xfrm>
+            <a:prstGeom prst="pie">
+              <a:avLst>
+                <a:gd name="adj1" fmla="val 20428"/>
+                <a:gd name="adj2" fmla="val 4494618"/>
+              </a:avLst>
+            </a:prstGeom>
+            <a:solidFill>
+              <a:schemeClr val="bg1"/>
+            </a:solidFill>
+            <a:ln w="19050">
+              <a:noFill/>
+              <a:prstDash val="lgDash"/>
+            </a:ln>
+          </p:spPr>
+          <p:style>
+            <a:lnRef idx="2">
+              <a:schemeClr val="accent1">
+                <a:shade val="50000"/>
+              </a:schemeClr>
+            </a:lnRef>
+            <a:fillRef idx="1">
+              <a:schemeClr val="accent1"/>
+            </a:fillRef>
+            <a:effectRef idx="0">
+              <a:schemeClr val="accent1"/>
+            </a:effectRef>
+            <a:fontRef idx="minor">
+              <a:schemeClr val="lt1"/>
+            </a:fontRef>
+          </p:style>
+          <p:txBody>
+            <a:bodyPr rtlCol="0" anchor="ctr"/>
+            <a:lstStyle/>
+            <a:p>
+              <a:pPr algn="ctr"/>
+              <a:endParaRPr lang="en-GB">
+                <a:solidFill>
+                  <a:schemeClr val="tx1"/>
+                </a:solidFill>
+              </a:endParaRPr>
+            </a:p>
+          </p:txBody>
+        </p:sp>
+        <p:grpSp>
+          <p:nvGrpSpPr>
+            <p:cNvPr id="10" name="Group 9"/>
+            <p:cNvGrpSpPr/>
+            <p:nvPr/>
+          </p:nvGrpSpPr>
+          <p:grpSpPr>
+            <a:xfrm>
+              <a:off x="4131211" y="2119085"/>
+              <a:ext cx="3503304" cy="1963226"/>
+              <a:chOff x="3579667" y="2409755"/>
+              <a:chExt cx="4872811" cy="2761128"/>
+            </a:xfrm>
+          </p:grpSpPr>
+          <p:sp>
+            <p:nvSpPr>
+              <p:cNvPr id="4" name="Rectangle 3"/>
+              <p:cNvSpPr/>
+              <p:nvPr/>
+            </p:nvSpPr>
+            <p:spPr>
+              <a:xfrm rot="2052924">
+                <a:off x="3579667" y="2409755"/>
+                <a:ext cx="3985147" cy="477672"/>
+              </a:xfrm>
+              <a:prstGeom prst="rect">
+                <a:avLst/>
+              </a:prstGeom>
+            </p:spPr>
+            <p:style>
+              <a:lnRef idx="2">
+                <a:schemeClr val="accent1">
+                  <a:shade val="50000"/>
+                </a:schemeClr>
+              </a:lnRef>
+              <a:fillRef idx="1">
+                <a:schemeClr val="accent1"/>
+              </a:fillRef>
+              <a:effectRef idx="0">
+                <a:schemeClr val="accent1"/>
+              </a:effectRef>
+              <a:fontRef idx="minor">
+                <a:schemeClr val="lt1"/>
+              </a:fontRef>
+            </p:style>
+            <p:txBody>
+              <a:bodyPr rtlCol="0" anchor="ctr"/>
+              <a:lstStyle/>
+              <a:p>
+                <a:pPr algn="ctr"/>
+                <a:endParaRPr lang="en-GB"/>
+              </a:p>
+            </p:txBody>
+          </p:sp>
+          <p:grpSp>
+            <p:nvGrpSpPr>
+              <p:cNvPr id="8" name="Group 7"/>
+              <p:cNvGrpSpPr/>
+              <p:nvPr/>
+            </p:nvGrpSpPr>
+            <p:grpSpPr>
+              <a:xfrm rot="18266766">
+                <a:off x="6736673" y="3455079"/>
+                <a:ext cx="2064579" cy="1367030"/>
+                <a:chOff x="6432308" y="4442018"/>
+                <a:chExt cx="2064579" cy="1367030"/>
+              </a:xfrm>
+            </p:grpSpPr>
+            <p:sp>
+              <p:nvSpPr>
+                <p:cNvPr id="5" name="Rectangle 4"/>
+                <p:cNvSpPr/>
+                <p:nvPr/>
+              </p:nvSpPr>
+              <p:spPr>
+                <a:xfrm>
+                  <a:off x="6432308" y="4445391"/>
+                  <a:ext cx="2064579" cy="45719"/>
+                </a:xfrm>
+                <a:prstGeom prst="rect">
+                  <a:avLst/>
+                </a:prstGeom>
+              </p:spPr>
+              <p:style>
+                <a:lnRef idx="2">
+                  <a:schemeClr val="accent1">
+                    <a:shade val="50000"/>
+                  </a:schemeClr>
+                </a:lnRef>
+                <a:fillRef idx="1">
+                  <a:schemeClr val="accent1"/>
+                </a:fillRef>
+                <a:effectRef idx="0">
+                  <a:schemeClr val="accent1"/>
+                </a:effectRef>
+                <a:fontRef idx="minor">
+                  <a:schemeClr val="lt1"/>
+                </a:fontRef>
+              </p:style>
+              <p:txBody>
+                <a:bodyPr rtlCol="0" anchor="ctr"/>
+                <a:lstStyle/>
+                <a:p>
+                  <a:pPr algn="ctr"/>
+                  <a:endParaRPr lang="en-GB"/>
+                </a:p>
+              </p:txBody>
+            </p:sp>
+            <p:sp>
+              <p:nvSpPr>
+                <p:cNvPr id="6" name="Rectangle 5"/>
+                <p:cNvSpPr/>
+                <p:nvPr/>
+              </p:nvSpPr>
+              <p:spPr>
+                <a:xfrm rot="5400000" flipV="1">
+                  <a:off x="5801118" y="5078126"/>
+                  <a:ext cx="1317936" cy="45719"/>
+                </a:xfrm>
+                <a:prstGeom prst="rect">
+                  <a:avLst/>
+                </a:prstGeom>
+              </p:spPr>
+              <p:style>
+                <a:lnRef idx="2">
+                  <a:schemeClr val="accent1">
+                    <a:shade val="50000"/>
+                  </a:schemeClr>
+                </a:lnRef>
+                <a:fillRef idx="1">
+                  <a:schemeClr val="accent1"/>
+                </a:fillRef>
+                <a:effectRef idx="0">
+                  <a:schemeClr val="accent1"/>
+                </a:effectRef>
+                <a:fontRef idx="minor">
+                  <a:schemeClr val="lt1"/>
+                </a:fontRef>
+              </p:style>
+              <p:txBody>
+                <a:bodyPr rtlCol="0" anchor="ctr"/>
+                <a:lstStyle/>
+                <a:p>
+                  <a:pPr algn="ctr"/>
+                  <a:endParaRPr lang="en-GB"/>
+                </a:p>
+              </p:txBody>
+            </p:sp>
+            <p:sp>
+              <p:nvSpPr>
+                <p:cNvPr id="7" name="Rectangle 6"/>
+                <p:cNvSpPr/>
+                <p:nvPr/>
+              </p:nvSpPr>
+              <p:spPr>
+                <a:xfrm rot="5400000" flipV="1">
+                  <a:off x="7809002" y="5127220"/>
+                  <a:ext cx="1317936" cy="45719"/>
+                </a:xfrm>
+                <a:prstGeom prst="rect">
+                  <a:avLst/>
+                </a:prstGeom>
+              </p:spPr>
+              <p:style>
+                <a:lnRef idx="2">
+                  <a:schemeClr val="accent1">
+                    <a:shade val="50000"/>
+                  </a:schemeClr>
+                </a:lnRef>
+                <a:fillRef idx="1">
+                  <a:schemeClr val="accent1"/>
+                </a:fillRef>
+                <a:effectRef idx="0">
+                  <a:schemeClr val="accent1"/>
+                </a:effectRef>
+                <a:fontRef idx="minor">
+                  <a:schemeClr val="lt1"/>
+                </a:fontRef>
+              </p:style>
+              <p:txBody>
+                <a:bodyPr rtlCol="0" anchor="ctr"/>
+                <a:lstStyle/>
+                <a:p>
+                  <a:pPr algn="ctr"/>
+                  <a:endParaRPr lang="en-GB"/>
+                </a:p>
+              </p:txBody>
+            </p:sp>
+          </p:grpSp>
+        </p:grpSp>
+        <p:sp>
+          <p:nvSpPr>
+            <p:cNvPr id="20" name="TextBox 19"/>
+            <p:cNvSpPr txBox="1"/>
+            <p:nvPr/>
+          </p:nvSpPr>
+          <p:spPr>
+            <a:xfrm>
+              <a:off x="7415131" y="2366200"/>
+              <a:ext cx="625492" cy="369332"/>
+            </a:xfrm>
+            <a:prstGeom prst="rect">
+              <a:avLst/>
+            </a:prstGeom>
+            <a:noFill/>
+          </p:spPr>
+          <p:txBody>
+            <a:bodyPr wrap="none" rtlCol="0">
+              <a:spAutoFit/>
+            </a:bodyPr>
+            <a:lstStyle/>
+            <a:p>
+              <a:r>
+                <a:rPr lang="en-GB" dirty="0" smtClean="0">
+                  <a:solidFill>
+                    <a:schemeClr val="accent5"/>
+                  </a:solidFill>
+                </a:rPr>
+                <a:t>Base</a:t>
+              </a:r>
+              <a:endParaRPr lang="en-GB" dirty="0">
+                <a:solidFill>
+                  <a:schemeClr val="accent5"/>
+                </a:solidFill>
+              </a:endParaRPr>
+            </a:p>
+          </p:txBody>
+        </p:sp>
+        <p:sp>
+          <p:nvSpPr>
+            <p:cNvPr id="21" name="TextBox 20"/>
+            <p:cNvSpPr txBox="1"/>
+            <p:nvPr/>
+          </p:nvSpPr>
+          <p:spPr>
+            <a:xfrm rot="1974035">
+              <a:off x="5350623" y="2156080"/>
+              <a:ext cx="582211" cy="369332"/>
+            </a:xfrm>
+            <a:prstGeom prst="rect">
+              <a:avLst/>
+            </a:prstGeom>
+            <a:noFill/>
+          </p:spPr>
+          <p:txBody>
+            <a:bodyPr wrap="none" rtlCol="0">
+              <a:spAutoFit/>
+            </a:bodyPr>
+            <a:lstStyle/>
+            <a:p>
+              <a:r>
+                <a:rPr lang="en-GB" dirty="0" smtClean="0">
+                  <a:solidFill>
+                    <a:schemeClr val="bg1"/>
+                  </a:solidFill>
+                </a:rPr>
+                <a:t>Arm</a:t>
+              </a:r>
+              <a:endParaRPr lang="en-GB" dirty="0">
+                <a:solidFill>
+                  <a:schemeClr val="bg1"/>
+                </a:solidFill>
+              </a:endParaRPr>
+            </a:p>
+          </p:txBody>
+        </p:sp>
+        <p:sp>
+          <p:nvSpPr>
+            <p:cNvPr id="3" name="Oval 2"/>
+            <p:cNvSpPr>
+              <a:spLocks noChangeAspect="1"/>
+            </p:cNvSpPr>
+            <p:nvPr/>
+          </p:nvSpPr>
+          <p:spPr>
+            <a:xfrm>
+              <a:off x="2853459" y="4806621"/>
+              <a:ext cx="108000" cy="108000"/>
+            </a:xfrm>
+            <a:prstGeom prst="ellipse">
+              <a:avLst/>
+            </a:prstGeom>
+            <a:solidFill>
+              <a:srgbClr val="FF0000"/>
+            </a:solidFill>
+            <a:ln>
+              <a:solidFill>
+                <a:srgbClr val="FF0000"/>
+              </a:solidFill>
+            </a:ln>
+          </p:spPr>
+          <p:style>
+            <a:lnRef idx="2">
+              <a:schemeClr val="accent1">
+                <a:shade val="50000"/>
+              </a:schemeClr>
+            </a:lnRef>
+            <a:fillRef idx="1">
+              <a:schemeClr val="accent1"/>
+            </a:fillRef>
+            <a:effectRef idx="0">
+              <a:schemeClr val="accent1"/>
+            </a:effectRef>
+            <a:fontRef idx="minor">
+              <a:schemeClr val="lt1"/>
+            </a:fontRef>
+          </p:style>
+          <p:txBody>
+            <a:bodyPr rtlCol="0" anchor="ctr"/>
+            <a:lstStyle/>
+            <a:p>
+              <a:pPr algn="ctr"/>
+              <a:endParaRPr lang="en-GB"/>
+            </a:p>
+          </p:txBody>
+        </p:sp>
+        <p:cxnSp>
+          <p:nvCxnSpPr>
+            <p:cNvPr id="25" name="Straight Connector 24"/>
+            <p:cNvCxnSpPr>
+              <a:stCxn id="3" idx="6"/>
+            </p:cNvCxnSpPr>
+            <p:nvPr/>
+          </p:nvCxnSpPr>
+          <p:spPr>
+            <a:xfrm flipV="1">
+              <a:off x="2961459" y="3087225"/>
+              <a:ext cx="3767887" cy="1773396"/>
+            </a:xfrm>
+            <a:prstGeom prst="line">
+              <a:avLst/>
+            </a:prstGeom>
+            <a:ln w="3175">
+              <a:solidFill>
+                <a:schemeClr val="tx1"/>
+              </a:solidFill>
+              <a:prstDash val="sysDash"/>
+              <a:headEnd type="none" w="med" len="med"/>
+              <a:tailEnd type="oval" w="lg" len="lg"/>
+            </a:ln>
+          </p:spPr>
+          <p:style>
+            <a:lnRef idx="1">
+              <a:schemeClr val="accent1"/>
+            </a:lnRef>
+            <a:fillRef idx="0">
+              <a:schemeClr val="accent1"/>
+            </a:fillRef>
+            <a:effectRef idx="0">
+              <a:schemeClr val="accent1"/>
+            </a:effectRef>
+            <a:fontRef idx="minor">
+              <a:schemeClr val="tx1"/>
+            </a:fontRef>
+          </p:style>
+        </p:cxnSp>
+        <p:cxnSp>
+          <p:nvCxnSpPr>
+            <p:cNvPr id="26" name="Straight Connector 25"/>
+            <p:cNvCxnSpPr/>
+            <p:nvPr/>
+          </p:nvCxnSpPr>
+          <p:spPr>
+            <a:xfrm flipV="1">
+              <a:off x="2977140" y="4338638"/>
+              <a:ext cx="1088162" cy="511890"/>
+            </a:xfrm>
+            <a:prstGeom prst="line">
+              <a:avLst/>
+            </a:prstGeom>
+            <a:ln w="19050">
+              <a:headEnd type="none"/>
+              <a:tailEnd type="triangle" w="lg" len="med"/>
+            </a:ln>
+          </p:spPr>
+          <p:style>
+            <a:lnRef idx="1">
+              <a:schemeClr val="accent1"/>
+            </a:lnRef>
+            <a:fillRef idx="0">
+              <a:schemeClr val="accent1"/>
+            </a:fillRef>
+            <a:effectRef idx="0">
+              <a:schemeClr val="accent1"/>
+            </a:effectRef>
+            <a:fontRef idx="minor">
+              <a:schemeClr val="tx1"/>
+            </a:fontRef>
+          </p:style>
+        </p:cxnSp>
+        <p:sp>
+          <p:nvSpPr>
+            <p:cNvPr id="28" name="TextBox 27"/>
+            <p:cNvSpPr txBox="1"/>
+            <p:nvPr/>
+          </p:nvSpPr>
+          <p:spPr>
+            <a:xfrm>
+              <a:off x="2815394" y="3905059"/>
+              <a:ext cx="1345751" cy="646331"/>
+            </a:xfrm>
+            <a:prstGeom prst="rect">
+              <a:avLst/>
+            </a:prstGeom>
+            <a:noFill/>
+          </p:spPr>
+          <p:txBody>
+            <a:bodyPr wrap="square" rtlCol="0">
+              <a:spAutoFit/>
+            </a:bodyPr>
+            <a:lstStyle/>
+            <a:p>
+              <a:r>
+                <a:rPr lang="en-GB" sz="1200" dirty="0" smtClean="0">
+                  <a:solidFill>
+                    <a:schemeClr val="accent5"/>
+                  </a:solidFill>
+                </a:rPr>
+                <a:t>New equivalent shifted point, still disregarded</a:t>
+              </a:r>
+              <a:endParaRPr lang="en-GB" sz="1200" dirty="0">
+                <a:solidFill>
+                  <a:schemeClr val="accent5"/>
+                </a:solidFill>
+              </a:endParaRPr>
+            </a:p>
+          </p:txBody>
+        </p:sp>
+        <p:sp>
+          <p:nvSpPr>
+            <p:cNvPr id="23" name="Oval 22"/>
+            <p:cNvSpPr>
+              <a:spLocks noChangeAspect="1"/>
+            </p:cNvSpPr>
+            <p:nvPr/>
+          </p:nvSpPr>
+          <p:spPr>
+            <a:xfrm>
+              <a:off x="4070163" y="4260171"/>
+              <a:ext cx="108000" cy="108000"/>
+            </a:xfrm>
+            <a:prstGeom prst="ellipse">
+              <a:avLst/>
+            </a:prstGeom>
+            <a:solidFill>
+              <a:schemeClr val="accent2"/>
+            </a:solidFill>
+            <a:ln>
+              <a:solidFill>
+                <a:schemeClr val="accent2"/>
+              </a:solidFill>
+            </a:ln>
+          </p:spPr>
+          <p:style>
+            <a:lnRef idx="2">
+              <a:schemeClr val="accent1">
+                <a:shade val="50000"/>
+              </a:schemeClr>
+            </a:lnRef>
+            <a:fillRef idx="1">
+              <a:schemeClr val="accent1"/>
+            </a:fillRef>
+            <a:effectRef idx="0">
+              <a:schemeClr val="accent1"/>
+            </a:effectRef>
+            <a:fontRef idx="minor">
+              <a:schemeClr val="lt1"/>
+            </a:fontRef>
+          </p:style>
+          <p:txBody>
+            <a:bodyPr rtlCol="0" anchor="ctr"/>
+            <a:lstStyle/>
+            <a:p>
+              <a:pPr algn="ctr"/>
+              <a:endParaRPr lang="en-GB"/>
+            </a:p>
+          </p:txBody>
+        </p:sp>
+      </p:grpSp>
+    </p:spTree>
+    <p:extLst>
+      <p:ext uri="{BB962C8B-B14F-4D97-AF65-F5344CB8AC3E}">
+        <p14:creationId xmlns:p14="http://schemas.microsoft.com/office/powerpoint/2010/main" val="2999117377"/>
+      </p:ext>
+    </p:extLst>
+  </p:cSld>
+  <p:clrMapOvr>
+    <a:masterClrMapping/>
+  </p:clrMapOvr>
+</p:sld>
+</file>
+
+<file path=ppt/slides/slide4.xml><?xml version="1.0" encoding="utf-8"?>
+<p:sld xmlns:a="http://schemas.openxmlformats.org/drawingml/2006/main" xmlns:r="http://schemas.openxmlformats.org/officeDocument/2006/relationships" xmlns:p="http://schemas.openxmlformats.org/presentationml/2006/main">
+  <p:cSld>
+    <p:spTree>
+      <p:nvGrpSpPr>
+        <p:cNvPr id="1" name=""/>
+        <p:cNvGrpSpPr/>
+        <p:nvPr/>
+      </p:nvGrpSpPr>
+      <p:grpSpPr>
+        <a:xfrm>
+          <a:off x="0" y="0"/>
+          <a:ext cx="0" cy="0"/>
+          <a:chOff x="0" y="0"/>
+          <a:chExt cx="0" cy="0"/>
+        </a:xfrm>
+      </p:grpSpPr>
+      <p:grpSp>
+        <p:nvGrpSpPr>
+          <p:cNvPr id="16" name="Group 15"/>
+          <p:cNvGrpSpPr/>
+          <p:nvPr/>
+        </p:nvGrpSpPr>
+        <p:grpSpPr>
+          <a:xfrm>
+            <a:off x="2722385" y="272658"/>
+            <a:ext cx="6966532" cy="5688335"/>
+            <a:chOff x="2722385" y="272658"/>
+            <a:chExt cx="6966532" cy="5688335"/>
+          </a:xfrm>
+        </p:grpSpPr>
+        <p:grpSp>
+          <p:nvGrpSpPr>
+            <p:cNvPr id="2" name="Group 1"/>
+            <p:cNvGrpSpPr/>
+            <p:nvPr/>
+          </p:nvGrpSpPr>
+          <p:grpSpPr>
+            <a:xfrm>
+              <a:off x="3830633" y="312696"/>
+              <a:ext cx="5671389" cy="5566493"/>
+              <a:chOff x="6624633" y="1923288"/>
+              <a:chExt cx="5671389" cy="5566493"/>
+            </a:xfrm>
+          </p:grpSpPr>
+          <p:sp>
+            <p:nvSpPr>
+              <p:cNvPr id="19" name="Oval 18"/>
+              <p:cNvSpPr/>
+              <p:nvPr/>
+            </p:nvSpPr>
+            <p:spPr>
+              <a:xfrm>
+                <a:off x="6624633" y="1923288"/>
+                <a:ext cx="5671389" cy="5566493"/>
+              </a:xfrm>
+              <a:prstGeom prst="ellipse">
+                <a:avLst/>
+              </a:prstGeom>
+              <a:solidFill>
+                <a:schemeClr val="accent1">
+                  <a:lumMod val="40000"/>
+                  <a:lumOff val="60000"/>
+                </a:schemeClr>
+              </a:solidFill>
+              <a:ln w="22225">
+                <a:noFill/>
+                <a:prstDash val="lgDash"/>
+              </a:ln>
+            </p:spPr>
+            <p:style>
+              <a:lnRef idx="2">
+                <a:schemeClr val="accent1">
+                  <a:shade val="50000"/>
+                </a:schemeClr>
+              </a:lnRef>
+              <a:fillRef idx="1">
+                <a:schemeClr val="accent1"/>
+              </a:fillRef>
+              <a:effectRef idx="0">
+                <a:schemeClr val="accent1"/>
+              </a:effectRef>
+              <a:fontRef idx="minor">
+                <a:schemeClr val="lt1"/>
+              </a:fontRef>
+            </p:style>
+            <p:txBody>
+              <a:bodyPr rtlCol="0" anchor="ctr"/>
+              <a:lstStyle/>
+              <a:p>
+                <a:pPr algn="ctr"/>
+                <a:endParaRPr lang="en-GB"/>
+              </a:p>
+            </p:txBody>
+          </p:sp>
+          <p:sp>
+            <p:nvSpPr>
+              <p:cNvPr id="24" name="Oval 23"/>
+              <p:cNvSpPr>
+                <a:spLocks noChangeAspect="1"/>
+              </p:cNvSpPr>
+              <p:nvPr/>
+            </p:nvSpPr>
+            <p:spPr>
+              <a:xfrm>
+                <a:off x="6966194" y="2258534"/>
+                <a:ext cx="4988268" cy="4896000"/>
+              </a:xfrm>
+              <a:prstGeom prst="ellipse">
+                <a:avLst/>
+              </a:prstGeom>
+              <a:solidFill>
+                <a:schemeClr val="bg1"/>
+              </a:solidFill>
+              <a:ln w="22225">
+                <a:noFill/>
+                <a:prstDash val="lgDash"/>
+              </a:ln>
+            </p:spPr>
+            <p:style>
+              <a:lnRef idx="2">
+                <a:schemeClr val="accent1">
+                  <a:shade val="50000"/>
+                </a:schemeClr>
+              </a:lnRef>
+              <a:fillRef idx="1">
+                <a:schemeClr val="accent1"/>
+              </a:fillRef>
+              <a:effectRef idx="0">
+                <a:schemeClr val="accent1"/>
+              </a:effectRef>
+              <a:fontRef idx="minor">
+                <a:schemeClr val="lt1"/>
+              </a:fontRef>
+            </p:style>
+            <p:txBody>
+              <a:bodyPr rtlCol="0" anchor="ctr"/>
+              <a:lstStyle/>
+              <a:p>
+                <a:pPr algn="ctr"/>
+                <a:endParaRPr lang="en-GB"/>
+              </a:p>
+            </p:txBody>
+          </p:sp>
+        </p:grpSp>
+        <p:sp>
+          <p:nvSpPr>
+            <p:cNvPr id="9" name="Oval 8"/>
+            <p:cNvSpPr/>
+            <p:nvPr/>
+          </p:nvSpPr>
+          <p:spPr>
+            <a:xfrm>
+              <a:off x="3835468" y="311794"/>
+              <a:ext cx="5671389" cy="5566493"/>
+            </a:xfrm>
+            <a:prstGeom prst="ellipse">
+              <a:avLst/>
+            </a:prstGeom>
+            <a:noFill/>
+            <a:ln w="22225">
+              <a:solidFill>
+                <a:schemeClr val="accent6"/>
+              </a:solidFill>
+              <a:prstDash val="lgDash"/>
+            </a:ln>
+          </p:spPr>
+          <p:style>
+            <a:lnRef idx="2">
+              <a:schemeClr val="accent1">
+                <a:shade val="50000"/>
+              </a:schemeClr>
+            </a:lnRef>
+            <a:fillRef idx="1">
+              <a:schemeClr val="accent1"/>
+            </a:fillRef>
+            <a:effectRef idx="0">
+              <a:schemeClr val="accent1"/>
+            </a:effectRef>
+            <a:fontRef idx="minor">
+              <a:schemeClr val="lt1"/>
+            </a:fontRef>
+          </p:style>
+          <p:txBody>
+            <a:bodyPr rtlCol="0" anchor="ctr"/>
+            <a:lstStyle/>
+            <a:p>
+              <a:pPr algn="ctr"/>
+              <a:endParaRPr lang="en-GB"/>
+            </a:p>
+          </p:txBody>
+        </p:sp>
+        <p:sp>
+          <p:nvSpPr>
+            <p:cNvPr id="34" name="Pie 33"/>
+            <p:cNvSpPr/>
+            <p:nvPr/>
+          </p:nvSpPr>
+          <p:spPr>
+            <a:xfrm rot="10632034">
+              <a:off x="3831113" y="272658"/>
+              <a:ext cx="5857804" cy="5688335"/>
+            </a:xfrm>
+            <a:prstGeom prst="pie">
+              <a:avLst>
+                <a:gd name="adj1" fmla="val 0"/>
+                <a:gd name="adj2" fmla="val 4494618"/>
+              </a:avLst>
+            </a:prstGeom>
+            <a:solidFill>
+              <a:schemeClr val="accent6">
+                <a:lumMod val="40000"/>
+                <a:lumOff val="60000"/>
+              </a:schemeClr>
+            </a:solidFill>
+            <a:ln w="19050">
+              <a:prstDash val="lgDash"/>
+            </a:ln>
+          </p:spPr>
+          <p:style>
+            <a:lnRef idx="2">
+              <a:schemeClr val="accent1">
+                <a:shade val="50000"/>
+              </a:schemeClr>
+            </a:lnRef>
+            <a:fillRef idx="1">
+              <a:schemeClr val="accent1"/>
+            </a:fillRef>
+            <a:effectRef idx="0">
+              <a:schemeClr val="accent1"/>
+            </a:effectRef>
+            <a:fontRef idx="minor">
+              <a:schemeClr val="lt1"/>
+            </a:fontRef>
+          </p:style>
+          <p:txBody>
+            <a:bodyPr rtlCol="0" anchor="ctr"/>
+            <a:lstStyle/>
+            <a:p>
+              <a:pPr algn="ctr"/>
+              <a:endParaRPr lang="en-GB">
+                <a:solidFill>
+                  <a:schemeClr val="tx1"/>
+                </a:solidFill>
+              </a:endParaRPr>
+            </a:p>
+          </p:txBody>
+        </p:sp>
+        <p:sp>
+          <p:nvSpPr>
+            <p:cNvPr id="35" name="Pie 34"/>
+            <p:cNvSpPr/>
+            <p:nvPr/>
+          </p:nvSpPr>
+          <p:spPr>
+            <a:xfrm rot="10632034">
+              <a:off x="4184834" y="606763"/>
+              <a:ext cx="5127122" cy="5020124"/>
+            </a:xfrm>
+            <a:prstGeom prst="pie">
+              <a:avLst>
+                <a:gd name="adj1" fmla="val 20428"/>
+                <a:gd name="adj2" fmla="val 4494618"/>
+              </a:avLst>
+            </a:prstGeom>
+            <a:solidFill>
+              <a:schemeClr val="bg1"/>
+            </a:solidFill>
+            <a:ln w="19050">
+              <a:noFill/>
+              <a:prstDash val="lgDash"/>
+            </a:ln>
+          </p:spPr>
+          <p:style>
+            <a:lnRef idx="2">
+              <a:schemeClr val="accent1">
+                <a:shade val="50000"/>
+              </a:schemeClr>
+            </a:lnRef>
+            <a:fillRef idx="1">
+              <a:schemeClr val="accent1"/>
+            </a:fillRef>
+            <a:effectRef idx="0">
+              <a:schemeClr val="accent1"/>
+            </a:effectRef>
+            <a:fontRef idx="minor">
+              <a:schemeClr val="lt1"/>
+            </a:fontRef>
+          </p:style>
+          <p:txBody>
+            <a:bodyPr rtlCol="0" anchor="ctr"/>
+            <a:lstStyle/>
+            <a:p>
+              <a:pPr algn="ctr"/>
+              <a:endParaRPr lang="en-GB">
+                <a:solidFill>
+                  <a:schemeClr val="tx1"/>
+                </a:solidFill>
+              </a:endParaRPr>
+            </a:p>
+          </p:txBody>
+        </p:sp>
+        <p:grpSp>
+          <p:nvGrpSpPr>
+            <p:cNvPr id="10" name="Group 9"/>
+            <p:cNvGrpSpPr/>
+            <p:nvPr/>
+          </p:nvGrpSpPr>
+          <p:grpSpPr>
+            <a:xfrm>
+              <a:off x="4131211" y="2119085"/>
+              <a:ext cx="3503304" cy="1963226"/>
+              <a:chOff x="3579667" y="2409755"/>
+              <a:chExt cx="4872811" cy="2761128"/>
+            </a:xfrm>
+          </p:grpSpPr>
+          <p:sp>
+            <p:nvSpPr>
+              <p:cNvPr id="4" name="Rectangle 3"/>
+              <p:cNvSpPr/>
+              <p:nvPr/>
+            </p:nvSpPr>
+            <p:spPr>
+              <a:xfrm rot="2052924">
+                <a:off x="3579667" y="2409755"/>
+                <a:ext cx="3985147" cy="477672"/>
+              </a:xfrm>
+              <a:prstGeom prst="rect">
+                <a:avLst/>
+              </a:prstGeom>
+            </p:spPr>
+            <p:style>
+              <a:lnRef idx="2">
+                <a:schemeClr val="accent1">
+                  <a:shade val="50000"/>
+                </a:schemeClr>
+              </a:lnRef>
+              <a:fillRef idx="1">
+                <a:schemeClr val="accent1"/>
+              </a:fillRef>
+              <a:effectRef idx="0">
+                <a:schemeClr val="accent1"/>
+              </a:effectRef>
+              <a:fontRef idx="minor">
+                <a:schemeClr val="lt1"/>
+              </a:fontRef>
+            </p:style>
+            <p:txBody>
+              <a:bodyPr rtlCol="0" anchor="ctr"/>
+              <a:lstStyle/>
+              <a:p>
+                <a:pPr algn="ctr"/>
+                <a:endParaRPr lang="en-GB"/>
+              </a:p>
+            </p:txBody>
+          </p:sp>
+          <p:grpSp>
+            <p:nvGrpSpPr>
+              <p:cNvPr id="8" name="Group 7"/>
+              <p:cNvGrpSpPr/>
+              <p:nvPr/>
+            </p:nvGrpSpPr>
+            <p:grpSpPr>
+              <a:xfrm rot="18266766">
+                <a:off x="6736673" y="3455079"/>
+                <a:ext cx="2064579" cy="1367030"/>
+                <a:chOff x="6432308" y="4442018"/>
+                <a:chExt cx="2064579" cy="1367030"/>
+              </a:xfrm>
+            </p:grpSpPr>
+            <p:sp>
+              <p:nvSpPr>
+                <p:cNvPr id="5" name="Rectangle 4"/>
+                <p:cNvSpPr/>
+                <p:nvPr/>
+              </p:nvSpPr>
+              <p:spPr>
+                <a:xfrm>
+                  <a:off x="6432308" y="4445391"/>
+                  <a:ext cx="2064579" cy="45719"/>
+                </a:xfrm>
+                <a:prstGeom prst="rect">
+                  <a:avLst/>
+                </a:prstGeom>
+              </p:spPr>
+              <p:style>
+                <a:lnRef idx="2">
+                  <a:schemeClr val="accent1">
+                    <a:shade val="50000"/>
+                  </a:schemeClr>
+                </a:lnRef>
+                <a:fillRef idx="1">
+                  <a:schemeClr val="accent1"/>
+                </a:fillRef>
+                <a:effectRef idx="0">
+                  <a:schemeClr val="accent1"/>
+                </a:effectRef>
+                <a:fontRef idx="minor">
+                  <a:schemeClr val="lt1"/>
+                </a:fontRef>
+              </p:style>
+              <p:txBody>
+                <a:bodyPr rtlCol="0" anchor="ctr"/>
+                <a:lstStyle/>
+                <a:p>
+                  <a:pPr algn="ctr"/>
+                  <a:endParaRPr lang="en-GB"/>
+                </a:p>
+              </p:txBody>
+            </p:sp>
+            <p:sp>
+              <p:nvSpPr>
+                <p:cNvPr id="6" name="Rectangle 5"/>
+                <p:cNvSpPr/>
+                <p:nvPr/>
+              </p:nvSpPr>
+              <p:spPr>
+                <a:xfrm rot="5400000" flipV="1">
+                  <a:off x="5801118" y="5078126"/>
+                  <a:ext cx="1317936" cy="45719"/>
+                </a:xfrm>
+                <a:prstGeom prst="rect">
+                  <a:avLst/>
+                </a:prstGeom>
+              </p:spPr>
+              <p:style>
+                <a:lnRef idx="2">
+                  <a:schemeClr val="accent1">
+                    <a:shade val="50000"/>
+                  </a:schemeClr>
+                </a:lnRef>
+                <a:fillRef idx="1">
+                  <a:schemeClr val="accent1"/>
+                </a:fillRef>
+                <a:effectRef idx="0">
+                  <a:schemeClr val="accent1"/>
+                </a:effectRef>
+                <a:fontRef idx="minor">
+                  <a:schemeClr val="lt1"/>
+                </a:fontRef>
+              </p:style>
+              <p:txBody>
+                <a:bodyPr rtlCol="0" anchor="ctr"/>
+                <a:lstStyle/>
+                <a:p>
+                  <a:pPr algn="ctr"/>
+                  <a:endParaRPr lang="en-GB"/>
+                </a:p>
+              </p:txBody>
+            </p:sp>
+            <p:sp>
+              <p:nvSpPr>
+                <p:cNvPr id="7" name="Rectangle 6"/>
+                <p:cNvSpPr/>
+                <p:nvPr/>
+              </p:nvSpPr>
+              <p:spPr>
+                <a:xfrm rot="5400000" flipV="1">
+                  <a:off x="7809002" y="5127220"/>
+                  <a:ext cx="1317936" cy="45719"/>
+                </a:xfrm>
+                <a:prstGeom prst="rect">
+                  <a:avLst/>
+                </a:prstGeom>
+              </p:spPr>
+              <p:style>
+                <a:lnRef idx="2">
+                  <a:schemeClr val="accent1">
+                    <a:shade val="50000"/>
+                  </a:schemeClr>
+                </a:lnRef>
+                <a:fillRef idx="1">
+                  <a:schemeClr val="accent1"/>
+                </a:fillRef>
+                <a:effectRef idx="0">
+                  <a:schemeClr val="accent1"/>
+                </a:effectRef>
+                <a:fontRef idx="minor">
+                  <a:schemeClr val="lt1"/>
+                </a:fontRef>
+              </p:style>
+              <p:txBody>
+                <a:bodyPr rtlCol="0" anchor="ctr"/>
+                <a:lstStyle/>
+                <a:p>
+                  <a:pPr algn="ctr"/>
+                  <a:endParaRPr lang="en-GB"/>
+                </a:p>
+              </p:txBody>
+            </p:sp>
+          </p:grpSp>
+        </p:grpSp>
+        <p:sp>
+          <p:nvSpPr>
+            <p:cNvPr id="20" name="TextBox 19"/>
+            <p:cNvSpPr txBox="1"/>
+            <p:nvPr/>
+          </p:nvSpPr>
+          <p:spPr>
+            <a:xfrm>
+              <a:off x="7415131" y="2366200"/>
+              <a:ext cx="625492" cy="369332"/>
+            </a:xfrm>
+            <a:prstGeom prst="rect">
+              <a:avLst/>
+            </a:prstGeom>
+            <a:noFill/>
+          </p:spPr>
+          <p:txBody>
+            <a:bodyPr wrap="none" rtlCol="0">
+              <a:spAutoFit/>
+            </a:bodyPr>
+            <a:lstStyle/>
+            <a:p>
+              <a:r>
+                <a:rPr lang="en-GB" dirty="0" smtClean="0">
+                  <a:solidFill>
+                    <a:schemeClr val="accent5"/>
+                  </a:solidFill>
+                </a:rPr>
+                <a:t>Base</a:t>
+              </a:r>
+              <a:endParaRPr lang="en-GB" dirty="0">
+                <a:solidFill>
+                  <a:schemeClr val="accent5"/>
+                </a:solidFill>
+              </a:endParaRPr>
+            </a:p>
+          </p:txBody>
+        </p:sp>
+        <p:sp>
+          <p:nvSpPr>
+            <p:cNvPr id="21" name="TextBox 20"/>
+            <p:cNvSpPr txBox="1"/>
+            <p:nvPr/>
+          </p:nvSpPr>
+          <p:spPr>
+            <a:xfrm rot="1974035">
+              <a:off x="5350623" y="2156080"/>
+              <a:ext cx="582211" cy="369332"/>
+            </a:xfrm>
+            <a:prstGeom prst="rect">
+              <a:avLst/>
+            </a:prstGeom>
+            <a:noFill/>
+          </p:spPr>
+          <p:txBody>
+            <a:bodyPr wrap="none" rtlCol="0">
+              <a:spAutoFit/>
+            </a:bodyPr>
+            <a:lstStyle/>
+            <a:p>
+              <a:r>
+                <a:rPr lang="en-GB" dirty="0" smtClean="0">
+                  <a:solidFill>
+                    <a:schemeClr val="bg1"/>
+                  </a:solidFill>
+                </a:rPr>
+                <a:t>Arm</a:t>
+              </a:r>
+              <a:endParaRPr lang="en-GB" dirty="0">
+                <a:solidFill>
+                  <a:schemeClr val="bg1"/>
+                </a:solidFill>
+              </a:endParaRPr>
+            </a:p>
+          </p:txBody>
+        </p:sp>
+        <p:sp>
+          <p:nvSpPr>
+            <p:cNvPr id="23" name="Oval 22"/>
+            <p:cNvSpPr>
+              <a:spLocks noChangeAspect="1"/>
+            </p:cNvSpPr>
+            <p:nvPr/>
+          </p:nvSpPr>
+          <p:spPr>
+            <a:xfrm>
+              <a:off x="4070163" y="4260171"/>
+              <a:ext cx="108000" cy="108000"/>
+            </a:xfrm>
+            <a:prstGeom prst="ellipse">
+              <a:avLst/>
+            </a:prstGeom>
+            <a:solidFill>
+              <a:schemeClr val="accent2"/>
+            </a:solidFill>
+            <a:ln>
+              <a:solidFill>
+                <a:schemeClr val="accent2"/>
+              </a:solidFill>
+            </a:ln>
+          </p:spPr>
+          <p:style>
+            <a:lnRef idx="2">
+              <a:schemeClr val="accent1">
+                <a:shade val="50000"/>
+              </a:schemeClr>
+            </a:lnRef>
+            <a:fillRef idx="1">
+              <a:schemeClr val="accent1"/>
+            </a:fillRef>
+            <a:effectRef idx="0">
+              <a:schemeClr val="accent1"/>
+            </a:effectRef>
+            <a:fontRef idx="minor">
+              <a:schemeClr val="lt1"/>
+            </a:fontRef>
+          </p:style>
+          <p:txBody>
+            <a:bodyPr rtlCol="0" anchor="ctr"/>
+            <a:lstStyle/>
+            <a:p>
+              <a:pPr algn="ctr"/>
+              <a:endParaRPr lang="en-GB"/>
+            </a:p>
+          </p:txBody>
+        </p:sp>
+        <p:sp>
+          <p:nvSpPr>
+            <p:cNvPr id="22" name="Oval 21"/>
+            <p:cNvSpPr>
+              <a:spLocks noChangeAspect="1"/>
+            </p:cNvSpPr>
+            <p:nvPr/>
+          </p:nvSpPr>
+          <p:spPr>
+            <a:xfrm>
+              <a:off x="3808535" y="3127755"/>
+              <a:ext cx="144000" cy="144000"/>
+            </a:xfrm>
+            <a:prstGeom prst="ellipse">
+              <a:avLst/>
+            </a:prstGeom>
+            <a:solidFill>
+              <a:schemeClr val="accent6">
+                <a:lumMod val="75000"/>
+              </a:schemeClr>
+            </a:solidFill>
+            <a:ln>
+              <a:solidFill>
+                <a:schemeClr val="accent6">
+                  <a:lumMod val="75000"/>
+                </a:schemeClr>
+              </a:solidFill>
+            </a:ln>
+          </p:spPr>
+          <p:style>
+            <a:lnRef idx="2">
+              <a:schemeClr val="accent1">
+                <a:shade val="50000"/>
+              </a:schemeClr>
+            </a:lnRef>
+            <a:fillRef idx="1">
+              <a:schemeClr val="accent1"/>
+            </a:fillRef>
+            <a:effectRef idx="0">
+              <a:schemeClr val="accent1"/>
+            </a:effectRef>
+            <a:fontRef idx="minor">
+              <a:schemeClr val="lt1"/>
+            </a:fontRef>
+          </p:style>
+          <p:txBody>
+            <a:bodyPr rtlCol="0" anchor="ctr"/>
+            <a:lstStyle/>
+            <a:p>
+              <a:pPr algn="ctr"/>
+              <a:endParaRPr lang="en-GB"/>
+            </a:p>
+          </p:txBody>
+        </p:sp>
+        <p:sp>
+          <p:nvSpPr>
+            <p:cNvPr id="11" name="Cross 10"/>
+            <p:cNvSpPr>
+              <a:spLocks noChangeAspect="1"/>
+            </p:cNvSpPr>
+            <p:nvPr/>
+          </p:nvSpPr>
+          <p:spPr>
+            <a:xfrm>
+              <a:off x="3736535" y="3055755"/>
+              <a:ext cx="288000" cy="288000"/>
+            </a:xfrm>
+            <a:prstGeom prst="plus">
+              <a:avLst>
+                <a:gd name="adj" fmla="val 47222"/>
+              </a:avLst>
+            </a:prstGeom>
+            <a:solidFill>
+              <a:schemeClr val="accent6">
+                <a:lumMod val="75000"/>
+              </a:schemeClr>
+            </a:solidFill>
+            <a:ln>
+              <a:solidFill>
+                <a:schemeClr val="accent6">
+                  <a:lumMod val="75000"/>
+                </a:schemeClr>
+              </a:solidFill>
+            </a:ln>
+          </p:spPr>
+          <p:style>
+            <a:lnRef idx="2">
+              <a:schemeClr val="accent1">
+                <a:shade val="50000"/>
+              </a:schemeClr>
+            </a:lnRef>
+            <a:fillRef idx="1">
+              <a:schemeClr val="accent1"/>
+            </a:fillRef>
+            <a:effectRef idx="0">
+              <a:schemeClr val="accent1"/>
+            </a:effectRef>
+            <a:fontRef idx="minor">
+              <a:schemeClr val="lt1"/>
+            </a:fontRef>
+          </p:style>
+          <p:txBody>
+            <a:bodyPr rtlCol="0" anchor="ctr"/>
+            <a:lstStyle/>
+            <a:p>
+              <a:pPr algn="ctr"/>
+              <a:endParaRPr lang="en-GB"/>
+            </a:p>
+          </p:txBody>
+        </p:sp>
+        <p:cxnSp>
+          <p:nvCxnSpPr>
+            <p:cNvPr id="29" name="Straight Connector 28"/>
+            <p:cNvCxnSpPr>
+              <a:stCxn id="23" idx="0"/>
+            </p:cNvCxnSpPr>
+            <p:nvPr/>
+          </p:nvCxnSpPr>
+          <p:spPr>
+            <a:xfrm flipH="1" flipV="1">
+              <a:off x="3913447" y="3283241"/>
+              <a:ext cx="210716" cy="976930"/>
+            </a:xfrm>
+            <a:prstGeom prst="line">
+              <a:avLst/>
+            </a:prstGeom>
+            <a:ln w="19050">
+              <a:solidFill>
+                <a:schemeClr val="accent1"/>
+              </a:solidFill>
+              <a:headEnd type="none"/>
+              <a:tailEnd type="triangle" w="lg" len="med"/>
+            </a:ln>
+          </p:spPr>
+          <p:style>
+            <a:lnRef idx="1">
+              <a:schemeClr val="accent1"/>
+            </a:lnRef>
+            <a:fillRef idx="0">
+              <a:schemeClr val="accent1"/>
+            </a:fillRef>
+            <a:effectRef idx="0">
+              <a:schemeClr val="accent1"/>
+            </a:effectRef>
+            <a:fontRef idx="minor">
+              <a:schemeClr val="tx1"/>
+            </a:fontRef>
+          </p:style>
+        </p:cxnSp>
+        <p:sp>
+          <p:nvSpPr>
+            <p:cNvPr id="30" name="TextBox 29"/>
+            <p:cNvSpPr txBox="1"/>
+            <p:nvPr/>
+          </p:nvSpPr>
+          <p:spPr>
+            <a:xfrm>
+              <a:off x="2722385" y="2959173"/>
+              <a:ext cx="1266989" cy="646331"/>
+            </a:xfrm>
+            <a:prstGeom prst="rect">
+              <a:avLst/>
+            </a:prstGeom>
+            <a:noFill/>
+          </p:spPr>
+          <p:txBody>
+            <a:bodyPr wrap="square" rtlCol="0">
+              <a:spAutoFit/>
+            </a:bodyPr>
+            <a:lstStyle/>
+            <a:p>
+              <a:r>
+                <a:rPr lang="en-GB" sz="1200" dirty="0" smtClean="0">
+                  <a:solidFill>
+                    <a:schemeClr val="accent5"/>
+                  </a:solidFill>
+                </a:rPr>
+                <a:t>Compromise, closest point, now achievable</a:t>
+              </a:r>
+              <a:endParaRPr lang="en-GB" sz="1200" dirty="0">
+                <a:solidFill>
+                  <a:schemeClr val="accent5"/>
+                </a:solidFill>
+              </a:endParaRPr>
+            </a:p>
+          </p:txBody>
+        </p:sp>
+        <p:pic>
+          <p:nvPicPr>
+            <p:cNvPr id="1028" name="Picture 4" descr="http://www.clker.com/cliparts/2/k/n/l/C/Q/transparent-green-checkmark-hi.png"/>
+            <p:cNvPicPr>
+              <a:picLocks noChangeAspect="1" noChangeArrowheads="1"/>
+            </p:cNvPicPr>
+            <p:nvPr/>
+          </p:nvPicPr>
+          <p:blipFill>
+            <a:blip r:embed="rId2" cstate="print">
+              <a:extLst>
+                <a:ext uri="{28A0092B-C50C-407E-A947-70E740481C1C}">
+                  <a14:useLocalDpi xmlns:a14="http://schemas.microsoft.com/office/drawing/2010/main" val="0"/>
+                </a:ext>
+              </a:extLst>
+            </a:blip>
+            <a:srcRect/>
+            <a:stretch>
+              <a:fillRect/>
+            </a:stretch>
+          </p:blipFill>
+          <p:spPr bwMode="auto">
+            <a:xfrm>
+              <a:off x="3075381" y="2448963"/>
+              <a:ext cx="437778" cy="456210"/>
+            </a:xfrm>
+            <a:prstGeom prst="rect">
+              <a:avLst/>
+            </a:prstGeom>
+            <a:noFill/>
+            <a:extLst>
+              <a:ext uri="{909E8E84-426E-40DD-AFC4-6F175D3DCCD1}">
+                <a14:hiddenFill xmlns:a14="http://schemas.microsoft.com/office/drawing/2010/main">
+                  <a:solidFill>
+                    <a:srgbClr val="FFFFFF"/>
+                  </a:solidFill>
+                </a14:hiddenFill>
+              </a:ext>
+            </a:extLst>
+          </p:spPr>
+        </p:pic>
+      </p:grpSp>
+    </p:spTree>
+    <p:extLst>
+      <p:ext uri="{BB962C8B-B14F-4D97-AF65-F5344CB8AC3E}">
+        <p14:creationId xmlns:p14="http://schemas.microsoft.com/office/powerpoint/2010/main" val="3806321779"/>
       </p:ext>
     </p:extLst>
   </p:cSld>

</xml_diff>

<commit_message>
more to design process of thesis
</commit_message>
<xml_diff>
--- a/MSc Thesis/images/TipSphere.pptx
+++ b/MSc Thesis/images/TipSphere.pptx
@@ -246,7 +246,7 @@
           <a:p>
             <a:fld id="{5830AA71-20C6-4B3D-9F8B-0E61A1E3EA63}" type="datetimeFigureOut">
               <a:rPr lang="en-GB" smtClean="0"/>
-              <a:t>08/09/2016</a:t>
+              <a:t>06/10/2016</a:t>
             </a:fld>
             <a:endParaRPr lang="en-GB"/>
           </a:p>
@@ -416,7 +416,7 @@
           <a:p>
             <a:fld id="{5830AA71-20C6-4B3D-9F8B-0E61A1E3EA63}" type="datetimeFigureOut">
               <a:rPr lang="en-GB" smtClean="0"/>
-              <a:t>08/09/2016</a:t>
+              <a:t>06/10/2016</a:t>
             </a:fld>
             <a:endParaRPr lang="en-GB"/>
           </a:p>
@@ -596,7 +596,7 @@
           <a:p>
             <a:fld id="{5830AA71-20C6-4B3D-9F8B-0E61A1E3EA63}" type="datetimeFigureOut">
               <a:rPr lang="en-GB" smtClean="0"/>
-              <a:t>08/09/2016</a:t>
+              <a:t>06/10/2016</a:t>
             </a:fld>
             <a:endParaRPr lang="en-GB"/>
           </a:p>
@@ -766,7 +766,7 @@
           <a:p>
             <a:fld id="{5830AA71-20C6-4B3D-9F8B-0E61A1E3EA63}" type="datetimeFigureOut">
               <a:rPr lang="en-GB" smtClean="0"/>
-              <a:t>08/09/2016</a:t>
+              <a:t>06/10/2016</a:t>
             </a:fld>
             <a:endParaRPr lang="en-GB"/>
           </a:p>
@@ -1012,7 +1012,7 @@
           <a:p>
             <a:fld id="{5830AA71-20C6-4B3D-9F8B-0E61A1E3EA63}" type="datetimeFigureOut">
               <a:rPr lang="en-GB" smtClean="0"/>
-              <a:t>08/09/2016</a:t>
+              <a:t>06/10/2016</a:t>
             </a:fld>
             <a:endParaRPr lang="en-GB"/>
           </a:p>
@@ -1244,7 +1244,7 @@
           <a:p>
             <a:fld id="{5830AA71-20C6-4B3D-9F8B-0E61A1E3EA63}" type="datetimeFigureOut">
               <a:rPr lang="en-GB" smtClean="0"/>
-              <a:t>08/09/2016</a:t>
+              <a:t>06/10/2016</a:t>
             </a:fld>
             <a:endParaRPr lang="en-GB"/>
           </a:p>
@@ -1611,7 +1611,7 @@
           <a:p>
             <a:fld id="{5830AA71-20C6-4B3D-9F8B-0E61A1E3EA63}" type="datetimeFigureOut">
               <a:rPr lang="en-GB" smtClean="0"/>
-              <a:t>08/09/2016</a:t>
+              <a:t>06/10/2016</a:t>
             </a:fld>
             <a:endParaRPr lang="en-GB"/>
           </a:p>
@@ -1729,7 +1729,7 @@
           <a:p>
             <a:fld id="{5830AA71-20C6-4B3D-9F8B-0E61A1E3EA63}" type="datetimeFigureOut">
               <a:rPr lang="en-GB" smtClean="0"/>
-              <a:t>08/09/2016</a:t>
+              <a:t>06/10/2016</a:t>
             </a:fld>
             <a:endParaRPr lang="en-GB"/>
           </a:p>
@@ -1824,7 +1824,7 @@
           <a:p>
             <a:fld id="{5830AA71-20C6-4B3D-9F8B-0E61A1E3EA63}" type="datetimeFigureOut">
               <a:rPr lang="en-GB" smtClean="0"/>
-              <a:t>08/09/2016</a:t>
+              <a:t>06/10/2016</a:t>
             </a:fld>
             <a:endParaRPr lang="en-GB"/>
           </a:p>
@@ -2101,7 +2101,7 @@
           <a:p>
             <a:fld id="{5830AA71-20C6-4B3D-9F8B-0E61A1E3EA63}" type="datetimeFigureOut">
               <a:rPr lang="en-GB" smtClean="0"/>
-              <a:t>08/09/2016</a:t>
+              <a:t>06/10/2016</a:t>
             </a:fld>
             <a:endParaRPr lang="en-GB"/>
           </a:p>
@@ -2354,7 +2354,7 @@
           <a:p>
             <a:fld id="{5830AA71-20C6-4B3D-9F8B-0E61A1E3EA63}" type="datetimeFigureOut">
               <a:rPr lang="en-GB" smtClean="0"/>
-              <a:t>08/09/2016</a:t>
+              <a:t>06/10/2016</a:t>
             </a:fld>
             <a:endParaRPr lang="en-GB"/>
           </a:p>
@@ -2567,7 +2567,7 @@
           <a:p>
             <a:fld id="{5830AA71-20C6-4B3D-9F8B-0E61A1E3EA63}" type="datetimeFigureOut">
               <a:rPr lang="en-GB" smtClean="0"/>
-              <a:t>08/09/2016</a:t>
+              <a:t>06/10/2016</a:t>
             </a:fld>
             <a:endParaRPr lang="en-GB"/>
           </a:p>
@@ -2974,40 +2974,151 @@
       </p:grpSpPr>
       <p:grpSp>
         <p:nvGrpSpPr>
-          <p:cNvPr id="2" name="Group 1"/>
+          <p:cNvPr id="3" name="Group 2"/>
           <p:cNvGrpSpPr/>
           <p:nvPr/>
         </p:nvGrpSpPr>
         <p:grpSpPr>
           <a:xfrm>
-            <a:off x="3830633" y="312696"/>
-            <a:ext cx="5671389" cy="5566493"/>
-            <a:chOff x="6624633" y="1923288"/>
-            <a:chExt cx="5671389" cy="5566493"/>
+            <a:off x="3830633" y="272658"/>
+            <a:ext cx="5858284" cy="5688335"/>
+            <a:chOff x="3830633" y="272658"/>
+            <a:chExt cx="5858284" cy="5688335"/>
           </a:xfrm>
         </p:grpSpPr>
+        <p:grpSp>
+          <p:nvGrpSpPr>
+            <p:cNvPr id="2" name="Group 1"/>
+            <p:cNvGrpSpPr/>
+            <p:nvPr/>
+          </p:nvGrpSpPr>
+          <p:grpSpPr>
+            <a:xfrm>
+              <a:off x="3830633" y="312696"/>
+              <a:ext cx="5671389" cy="5566493"/>
+              <a:chOff x="6624633" y="1923288"/>
+              <a:chExt cx="5671389" cy="5566493"/>
+            </a:xfrm>
+          </p:grpSpPr>
+          <p:sp>
+            <p:nvSpPr>
+              <p:cNvPr id="19" name="Oval 18"/>
+              <p:cNvSpPr/>
+              <p:nvPr/>
+            </p:nvSpPr>
+            <p:spPr>
+              <a:xfrm>
+                <a:off x="6624633" y="1923288"/>
+                <a:ext cx="5671389" cy="5566493"/>
+              </a:xfrm>
+              <a:prstGeom prst="ellipse">
+                <a:avLst/>
+              </a:prstGeom>
+              <a:solidFill>
+                <a:schemeClr val="accent1">
+                  <a:lumMod val="40000"/>
+                  <a:lumOff val="60000"/>
+                </a:schemeClr>
+              </a:solidFill>
+              <a:ln w="22225">
+                <a:noFill/>
+                <a:prstDash val="lgDash"/>
+              </a:ln>
+            </p:spPr>
+            <p:style>
+              <a:lnRef idx="2">
+                <a:schemeClr val="accent1">
+                  <a:shade val="50000"/>
+                </a:schemeClr>
+              </a:lnRef>
+              <a:fillRef idx="1">
+                <a:schemeClr val="accent1"/>
+              </a:fillRef>
+              <a:effectRef idx="0">
+                <a:schemeClr val="accent1"/>
+              </a:effectRef>
+              <a:fontRef idx="minor">
+                <a:schemeClr val="lt1"/>
+              </a:fontRef>
+            </p:style>
+            <p:txBody>
+              <a:bodyPr rtlCol="0" anchor="ctr"/>
+              <a:lstStyle/>
+              <a:p>
+                <a:pPr algn="ctr"/>
+                <a:endParaRPr lang="en-GB"/>
+              </a:p>
+            </p:txBody>
+          </p:sp>
+          <p:sp>
+            <p:nvSpPr>
+              <p:cNvPr id="24" name="Oval 23"/>
+              <p:cNvSpPr>
+                <a:spLocks noChangeAspect="1"/>
+              </p:cNvSpPr>
+              <p:nvPr/>
+            </p:nvSpPr>
+            <p:spPr>
+              <a:xfrm>
+                <a:off x="6966194" y="2258534"/>
+                <a:ext cx="4988268" cy="4896000"/>
+              </a:xfrm>
+              <a:prstGeom prst="ellipse">
+                <a:avLst/>
+              </a:prstGeom>
+              <a:solidFill>
+                <a:schemeClr val="bg1"/>
+              </a:solidFill>
+              <a:ln w="22225">
+                <a:noFill/>
+                <a:prstDash val="lgDash"/>
+              </a:ln>
+            </p:spPr>
+            <p:style>
+              <a:lnRef idx="2">
+                <a:schemeClr val="accent1">
+                  <a:shade val="50000"/>
+                </a:schemeClr>
+              </a:lnRef>
+              <a:fillRef idx="1">
+                <a:schemeClr val="accent1"/>
+              </a:fillRef>
+              <a:effectRef idx="0">
+                <a:schemeClr val="accent1"/>
+              </a:effectRef>
+              <a:fontRef idx="minor">
+                <a:schemeClr val="lt1"/>
+              </a:fontRef>
+            </p:style>
+            <p:txBody>
+              <a:bodyPr rtlCol="0" anchor="ctr"/>
+              <a:lstStyle/>
+              <a:p>
+                <a:pPr algn="ctr"/>
+                <a:endParaRPr lang="en-GB"/>
+              </a:p>
+            </p:txBody>
+          </p:sp>
+        </p:grpSp>
         <p:sp>
           <p:nvSpPr>
-            <p:cNvPr id="19" name="Oval 18"/>
+            <p:cNvPr id="9" name="Oval 8"/>
             <p:cNvSpPr/>
             <p:nvPr/>
           </p:nvSpPr>
           <p:spPr>
             <a:xfrm>
-              <a:off x="6624633" y="1923288"/>
+              <a:off x="3835468" y="311794"/>
               <a:ext cx="5671389" cy="5566493"/>
             </a:xfrm>
             <a:prstGeom prst="ellipse">
               <a:avLst/>
             </a:prstGeom>
-            <a:solidFill>
-              <a:schemeClr val="accent1">
-                <a:lumMod val="40000"/>
-                <a:lumOff val="60000"/>
-              </a:schemeClr>
-            </a:solidFill>
+            <a:noFill/>
             <a:ln w="22225">
-              <a:noFill/>
+              <a:solidFill>
+                <a:schemeClr val="accent6"/>
+              </a:solidFill>
               <a:prstDash val="lgDash"/>
             </a:ln>
           </p:spPr>
@@ -3038,24 +3149,81 @@
         </p:sp>
         <p:sp>
           <p:nvSpPr>
-            <p:cNvPr id="24" name="Oval 23"/>
-            <p:cNvSpPr>
-              <a:spLocks noChangeAspect="1"/>
-            </p:cNvSpPr>
+            <p:cNvPr id="34" name="Pie 33"/>
+            <p:cNvSpPr/>
             <p:nvPr/>
           </p:nvSpPr>
           <p:spPr>
-            <a:xfrm>
-              <a:off x="6966194" y="2258534"/>
-              <a:ext cx="4988268" cy="4896000"/>
+            <a:xfrm rot="10632034">
+              <a:off x="3831113" y="272658"/>
+              <a:ext cx="5857804" cy="5688335"/>
             </a:xfrm>
-            <a:prstGeom prst="ellipse">
-              <a:avLst/>
+            <a:prstGeom prst="pie">
+              <a:avLst>
+                <a:gd name="adj1" fmla="val 0"/>
+                <a:gd name="adj2" fmla="val 4494618"/>
+              </a:avLst>
+            </a:prstGeom>
+            <a:solidFill>
+              <a:schemeClr val="accent6">
+                <a:lumMod val="40000"/>
+                <a:lumOff val="60000"/>
+              </a:schemeClr>
+            </a:solidFill>
+            <a:ln w="19050">
+              <a:prstDash val="lgDash"/>
+            </a:ln>
+          </p:spPr>
+          <p:style>
+            <a:lnRef idx="2">
+              <a:schemeClr val="accent1">
+                <a:shade val="50000"/>
+              </a:schemeClr>
+            </a:lnRef>
+            <a:fillRef idx="1">
+              <a:schemeClr val="accent1"/>
+            </a:fillRef>
+            <a:effectRef idx="0">
+              <a:schemeClr val="accent1"/>
+            </a:effectRef>
+            <a:fontRef idx="minor">
+              <a:schemeClr val="lt1"/>
+            </a:fontRef>
+          </p:style>
+          <p:txBody>
+            <a:bodyPr rtlCol="0" anchor="ctr"/>
+            <a:lstStyle/>
+            <a:p>
+              <a:pPr algn="ctr"/>
+              <a:endParaRPr lang="en-GB">
+                <a:solidFill>
+                  <a:schemeClr val="tx1"/>
+                </a:solidFill>
+              </a:endParaRPr>
+            </a:p>
+          </p:txBody>
+        </p:sp>
+        <p:sp>
+          <p:nvSpPr>
+            <p:cNvPr id="35" name="Pie 34"/>
+            <p:cNvSpPr/>
+            <p:nvPr/>
+          </p:nvSpPr>
+          <p:spPr>
+            <a:xfrm rot="10632034">
+              <a:off x="4184834" y="606763"/>
+              <a:ext cx="5127122" cy="5020124"/>
+            </a:xfrm>
+            <a:prstGeom prst="pie">
+              <a:avLst>
+                <a:gd name="adj1" fmla="val 20428"/>
+                <a:gd name="adj2" fmla="val 4494618"/>
+              </a:avLst>
             </a:prstGeom>
             <a:solidFill>
               <a:schemeClr val="bg1"/>
             </a:solidFill>
-            <a:ln w="22225">
+            <a:ln w="19050">
               <a:noFill/>
               <a:prstDash val="lgDash"/>
             </a:ln>
@@ -3081,246 +3249,38 @@
             <a:lstStyle/>
             <a:p>
               <a:pPr algn="ctr"/>
-              <a:endParaRPr lang="en-GB"/>
-            </a:p>
-          </p:txBody>
-        </p:sp>
-      </p:grpSp>
-      <p:sp>
-        <p:nvSpPr>
-          <p:cNvPr id="9" name="Oval 8"/>
-          <p:cNvSpPr/>
-          <p:nvPr/>
-        </p:nvSpPr>
-        <p:spPr>
-          <a:xfrm>
-            <a:off x="3835468" y="311794"/>
-            <a:ext cx="5671389" cy="5566493"/>
-          </a:xfrm>
-          <a:prstGeom prst="ellipse">
-            <a:avLst/>
-          </a:prstGeom>
-          <a:noFill/>
-          <a:ln w="22225">
-            <a:solidFill>
-              <a:schemeClr val="accent6"/>
-            </a:solidFill>
-            <a:prstDash val="lgDash"/>
-          </a:ln>
-        </p:spPr>
-        <p:style>
-          <a:lnRef idx="2">
-            <a:schemeClr val="accent1">
-              <a:shade val="50000"/>
-            </a:schemeClr>
-          </a:lnRef>
-          <a:fillRef idx="1">
-            <a:schemeClr val="accent1"/>
-          </a:fillRef>
-          <a:effectRef idx="0">
-            <a:schemeClr val="accent1"/>
-          </a:effectRef>
-          <a:fontRef idx="minor">
-            <a:schemeClr val="lt1"/>
-          </a:fontRef>
-        </p:style>
-        <p:txBody>
-          <a:bodyPr rtlCol="0" anchor="ctr"/>
-          <a:lstStyle/>
-          <a:p>
-            <a:pPr algn="ctr"/>
-            <a:endParaRPr lang="en-GB"/>
-          </a:p>
-        </p:txBody>
-      </p:sp>
-      <p:sp>
-        <p:nvSpPr>
-          <p:cNvPr id="34" name="Pie 33"/>
-          <p:cNvSpPr/>
-          <p:nvPr/>
-        </p:nvSpPr>
-        <p:spPr>
-          <a:xfrm rot="10632034">
-            <a:off x="3831113" y="272658"/>
-            <a:ext cx="5857804" cy="5688335"/>
-          </a:xfrm>
-          <a:prstGeom prst="pie">
-            <a:avLst>
-              <a:gd name="adj1" fmla="val 0"/>
-              <a:gd name="adj2" fmla="val 4494618"/>
-            </a:avLst>
-          </a:prstGeom>
-          <a:solidFill>
-            <a:schemeClr val="accent6">
-              <a:lumMod val="40000"/>
-              <a:lumOff val="60000"/>
-            </a:schemeClr>
-          </a:solidFill>
-          <a:ln w="19050">
-            <a:prstDash val="lgDash"/>
-          </a:ln>
-        </p:spPr>
-        <p:style>
-          <a:lnRef idx="2">
-            <a:schemeClr val="accent1">
-              <a:shade val="50000"/>
-            </a:schemeClr>
-          </a:lnRef>
-          <a:fillRef idx="1">
-            <a:schemeClr val="accent1"/>
-          </a:fillRef>
-          <a:effectRef idx="0">
-            <a:schemeClr val="accent1"/>
-          </a:effectRef>
-          <a:fontRef idx="minor">
-            <a:schemeClr val="lt1"/>
-          </a:fontRef>
-        </p:style>
-        <p:txBody>
-          <a:bodyPr rtlCol="0" anchor="ctr"/>
-          <a:lstStyle/>
-          <a:p>
-            <a:pPr algn="ctr"/>
-            <a:endParaRPr lang="en-GB">
-              <a:solidFill>
-                <a:schemeClr val="tx1"/>
-              </a:solidFill>
-            </a:endParaRPr>
-          </a:p>
-        </p:txBody>
-      </p:sp>
-      <p:sp>
-        <p:nvSpPr>
-          <p:cNvPr id="35" name="Pie 34"/>
-          <p:cNvSpPr/>
-          <p:nvPr/>
-        </p:nvSpPr>
-        <p:spPr>
-          <a:xfrm rot="10632034">
-            <a:off x="4184834" y="606763"/>
-            <a:ext cx="5127122" cy="5020124"/>
-          </a:xfrm>
-          <a:prstGeom prst="pie">
-            <a:avLst>
-              <a:gd name="adj1" fmla="val 20428"/>
-              <a:gd name="adj2" fmla="val 4494618"/>
-            </a:avLst>
-          </a:prstGeom>
-          <a:solidFill>
-            <a:schemeClr val="bg1"/>
-          </a:solidFill>
-          <a:ln w="19050">
-            <a:noFill/>
-            <a:prstDash val="lgDash"/>
-          </a:ln>
-        </p:spPr>
-        <p:style>
-          <a:lnRef idx="2">
-            <a:schemeClr val="accent1">
-              <a:shade val="50000"/>
-            </a:schemeClr>
-          </a:lnRef>
-          <a:fillRef idx="1">
-            <a:schemeClr val="accent1"/>
-          </a:fillRef>
-          <a:effectRef idx="0">
-            <a:schemeClr val="accent1"/>
-          </a:effectRef>
-          <a:fontRef idx="minor">
-            <a:schemeClr val="lt1"/>
-          </a:fontRef>
-        </p:style>
-        <p:txBody>
-          <a:bodyPr rtlCol="0" anchor="ctr"/>
-          <a:lstStyle/>
-          <a:p>
-            <a:pPr algn="ctr"/>
-            <a:endParaRPr lang="en-GB">
-              <a:solidFill>
-                <a:schemeClr val="tx1"/>
-              </a:solidFill>
-            </a:endParaRPr>
-          </a:p>
-        </p:txBody>
-      </p:sp>
-      <p:grpSp>
-        <p:nvGrpSpPr>
-          <p:cNvPr id="10" name="Group 9"/>
-          <p:cNvGrpSpPr/>
-          <p:nvPr/>
-        </p:nvGrpSpPr>
-        <p:grpSpPr>
-          <a:xfrm>
-            <a:off x="4131211" y="2119085"/>
-            <a:ext cx="3503304" cy="1963226"/>
-            <a:chOff x="3579667" y="2409755"/>
-            <a:chExt cx="4872811" cy="2761128"/>
-          </a:xfrm>
-        </p:grpSpPr>
-        <p:sp>
-          <p:nvSpPr>
-            <p:cNvPr id="4" name="Rectangle 3"/>
-            <p:cNvSpPr/>
-            <p:nvPr/>
-          </p:nvSpPr>
-          <p:spPr>
-            <a:xfrm rot="2052924">
-              <a:off x="3579667" y="2409755"/>
-              <a:ext cx="3985147" cy="477672"/>
-            </a:xfrm>
-            <a:prstGeom prst="rect">
-              <a:avLst/>
-            </a:prstGeom>
-          </p:spPr>
-          <p:style>
-            <a:lnRef idx="2">
-              <a:schemeClr val="accent1">
-                <a:shade val="50000"/>
-              </a:schemeClr>
-            </a:lnRef>
-            <a:fillRef idx="1">
-              <a:schemeClr val="accent1"/>
-            </a:fillRef>
-            <a:effectRef idx="0">
-              <a:schemeClr val="accent1"/>
-            </a:effectRef>
-            <a:fontRef idx="minor">
-              <a:schemeClr val="lt1"/>
-            </a:fontRef>
-          </p:style>
-          <p:txBody>
-            <a:bodyPr rtlCol="0" anchor="ctr"/>
-            <a:lstStyle/>
-            <a:p>
-              <a:pPr algn="ctr"/>
-              <a:endParaRPr lang="en-GB"/>
+              <a:endParaRPr lang="en-GB">
+                <a:solidFill>
+                  <a:schemeClr val="tx1"/>
+                </a:solidFill>
+              </a:endParaRPr>
             </a:p>
           </p:txBody>
         </p:sp>
         <p:grpSp>
           <p:nvGrpSpPr>
-            <p:cNvPr id="8" name="Group 7"/>
+            <p:cNvPr id="10" name="Group 9"/>
             <p:cNvGrpSpPr/>
             <p:nvPr/>
           </p:nvGrpSpPr>
           <p:grpSpPr>
-            <a:xfrm rot="18266766">
-              <a:off x="6736673" y="3455079"/>
-              <a:ext cx="2064579" cy="1367030"/>
-              <a:chOff x="6432308" y="4442018"/>
-              <a:chExt cx="2064579" cy="1367030"/>
+            <a:xfrm>
+              <a:off x="4131211" y="2119085"/>
+              <a:ext cx="3496498" cy="1970853"/>
+              <a:chOff x="3579667" y="2409755"/>
+              <a:chExt cx="4863345" cy="2771855"/>
             </a:xfrm>
           </p:grpSpPr>
           <p:sp>
             <p:nvSpPr>
-              <p:cNvPr id="5" name="Rectangle 4"/>
+              <p:cNvPr id="4" name="Rectangle 3"/>
               <p:cNvSpPr/>
               <p:nvPr/>
             </p:nvSpPr>
             <p:spPr>
-              <a:xfrm>
-                <a:off x="6432308" y="4445391"/>
-                <a:ext cx="2064579" cy="45719"/>
+              <a:xfrm rot="2052924">
+                <a:off x="3579667" y="2409755"/>
+                <a:ext cx="3985147" cy="477672"/>
               </a:xfrm>
               <a:prstGeom prst="rect">
                 <a:avLst/>
@@ -3351,480 +3311,586 @@
               </a:p>
             </p:txBody>
           </p:sp>
-          <p:sp>
-            <p:nvSpPr>
-              <p:cNvPr id="6" name="Rectangle 5"/>
-              <p:cNvSpPr/>
+          <p:grpSp>
+            <p:nvGrpSpPr>
+              <p:cNvPr id="8" name="Group 7"/>
+              <p:cNvGrpSpPr/>
               <p:nvPr/>
-            </p:nvSpPr>
-            <p:spPr>
-              <a:xfrm rot="5400000" flipV="1">
-                <a:off x="5801118" y="5078126"/>
-                <a:ext cx="1317936" cy="45719"/>
+            </p:nvGrpSpPr>
+            <p:grpSpPr>
+              <a:xfrm rot="18266766">
+                <a:off x="6723446" y="3462044"/>
+                <a:ext cx="2078240" cy="1360892"/>
+                <a:chOff x="6418647" y="4442016"/>
+                <a:chExt cx="2078240" cy="1360892"/>
               </a:xfrm>
-              <a:prstGeom prst="rect">
-                <a:avLst/>
-              </a:prstGeom>
-            </p:spPr>
-            <p:style>
-              <a:lnRef idx="2">
-                <a:schemeClr val="accent1">
-                  <a:shade val="50000"/>
-                </a:schemeClr>
-              </a:lnRef>
-              <a:fillRef idx="1">
-                <a:schemeClr val="accent1"/>
-              </a:fillRef>
-              <a:effectRef idx="0">
-                <a:schemeClr val="accent1"/>
-              </a:effectRef>
-              <a:fontRef idx="minor">
-                <a:schemeClr val="lt1"/>
-              </a:fontRef>
-            </p:style>
-            <p:txBody>
-              <a:bodyPr rtlCol="0" anchor="ctr"/>
-              <a:lstStyle/>
-              <a:p>
-                <a:pPr algn="ctr"/>
-                <a:endParaRPr lang="en-GB"/>
-              </a:p>
-            </p:txBody>
-          </p:sp>
-          <p:sp>
-            <p:nvSpPr>
-              <p:cNvPr id="7" name="Rectangle 6"/>
-              <p:cNvSpPr/>
-              <p:nvPr/>
-            </p:nvSpPr>
-            <p:spPr>
-              <a:xfrm rot="5400000" flipV="1">
-                <a:off x="7809002" y="5127220"/>
-                <a:ext cx="1317936" cy="45719"/>
-              </a:xfrm>
-              <a:prstGeom prst="rect">
-                <a:avLst/>
-              </a:prstGeom>
-            </p:spPr>
-            <p:style>
-              <a:lnRef idx="2">
-                <a:schemeClr val="accent1">
-                  <a:shade val="50000"/>
-                </a:schemeClr>
-              </a:lnRef>
-              <a:fillRef idx="1">
-                <a:schemeClr val="accent1"/>
-              </a:fillRef>
-              <a:effectRef idx="0">
-                <a:schemeClr val="accent1"/>
-              </a:effectRef>
-              <a:fontRef idx="minor">
-                <a:schemeClr val="lt1"/>
-              </a:fontRef>
-            </p:style>
-            <p:txBody>
-              <a:bodyPr rtlCol="0" anchor="ctr"/>
-              <a:lstStyle/>
-              <a:p>
-                <a:pPr algn="ctr"/>
-                <a:endParaRPr lang="en-GB"/>
-              </a:p>
-            </p:txBody>
-          </p:sp>
+            </p:grpSpPr>
+            <p:sp>
+              <p:nvSpPr>
+                <p:cNvPr id="5" name="Rectangle 4"/>
+                <p:cNvSpPr/>
+                <p:nvPr/>
+              </p:nvSpPr>
+              <p:spPr>
+                <a:xfrm>
+                  <a:off x="6432308" y="4445391"/>
+                  <a:ext cx="2064579" cy="45719"/>
+                </a:xfrm>
+                <a:prstGeom prst="rect">
+                  <a:avLst/>
+                </a:prstGeom>
+              </p:spPr>
+              <p:style>
+                <a:lnRef idx="2">
+                  <a:schemeClr val="accent1">
+                    <a:shade val="50000"/>
+                  </a:schemeClr>
+                </a:lnRef>
+                <a:fillRef idx="1">
+                  <a:schemeClr val="accent1"/>
+                </a:fillRef>
+                <a:effectRef idx="0">
+                  <a:schemeClr val="accent1"/>
+                </a:effectRef>
+                <a:fontRef idx="minor">
+                  <a:schemeClr val="lt1"/>
+                </a:fontRef>
+              </p:style>
+              <p:txBody>
+                <a:bodyPr rtlCol="0" anchor="ctr"/>
+                <a:lstStyle/>
+                <a:p>
+                  <a:pPr algn="ctr"/>
+                  <a:endParaRPr lang="en-GB"/>
+                </a:p>
+              </p:txBody>
+            </p:sp>
+            <p:sp>
+              <p:nvSpPr>
+                <p:cNvPr id="6" name="Rectangle 5"/>
+                <p:cNvSpPr/>
+                <p:nvPr/>
+              </p:nvSpPr>
+              <p:spPr>
+                <a:xfrm rot="5400000" flipV="1">
+                  <a:off x="5778391" y="5082272"/>
+                  <a:ext cx="1344811" cy="64300"/>
+                </a:xfrm>
+                <a:prstGeom prst="rect">
+                  <a:avLst/>
+                </a:prstGeom>
+              </p:spPr>
+              <p:style>
+                <a:lnRef idx="2">
+                  <a:schemeClr val="accent1">
+                    <a:shade val="50000"/>
+                  </a:schemeClr>
+                </a:lnRef>
+                <a:fillRef idx="1">
+                  <a:schemeClr val="accent1"/>
+                </a:fillRef>
+                <a:effectRef idx="0">
+                  <a:schemeClr val="accent1"/>
+                </a:effectRef>
+                <a:fontRef idx="minor">
+                  <a:schemeClr val="lt1"/>
+                </a:fontRef>
+              </p:style>
+              <p:txBody>
+                <a:bodyPr rtlCol="0" anchor="ctr"/>
+                <a:lstStyle/>
+                <a:p>
+                  <a:pPr algn="ctr"/>
+                  <a:endParaRPr lang="en-GB"/>
+                </a:p>
+              </p:txBody>
+            </p:sp>
+            <p:sp>
+              <p:nvSpPr>
+                <p:cNvPr id="7" name="Rectangle 6"/>
+                <p:cNvSpPr/>
+                <p:nvPr/>
+              </p:nvSpPr>
+              <p:spPr>
+                <a:xfrm rot="5400000" flipV="1">
+                  <a:off x="7802783" y="5114860"/>
+                  <a:ext cx="1311797" cy="64300"/>
+                </a:xfrm>
+                <a:prstGeom prst="rect">
+                  <a:avLst/>
+                </a:prstGeom>
+              </p:spPr>
+              <p:style>
+                <a:lnRef idx="2">
+                  <a:schemeClr val="accent1">
+                    <a:shade val="50000"/>
+                  </a:schemeClr>
+                </a:lnRef>
+                <a:fillRef idx="1">
+                  <a:schemeClr val="accent1"/>
+                </a:fillRef>
+                <a:effectRef idx="0">
+                  <a:schemeClr val="accent1"/>
+                </a:effectRef>
+                <a:fontRef idx="minor">
+                  <a:schemeClr val="lt1"/>
+                </a:fontRef>
+              </p:style>
+              <p:txBody>
+                <a:bodyPr rtlCol="0" anchor="ctr"/>
+                <a:lstStyle/>
+                <a:p>
+                  <a:pPr algn="ctr"/>
+                  <a:endParaRPr lang="en-GB"/>
+                </a:p>
+              </p:txBody>
+            </p:sp>
+          </p:grpSp>
         </p:grpSp>
-      </p:grpSp>
-      <p:cxnSp>
-        <p:nvCxnSpPr>
-          <p:cNvPr id="12" name="Straight Connector 11"/>
-          <p:cNvCxnSpPr>
-            <a:endCxn id="4" idx="3"/>
-          </p:cNvCxnSpPr>
-          <p:nvPr/>
-        </p:nvCxnSpPr>
-        <p:spPr>
-          <a:xfrm flipV="1">
-            <a:off x="4397829" y="3094439"/>
-            <a:ext cx="2350567" cy="1716984"/>
-          </a:xfrm>
-          <a:prstGeom prst="line">
-            <a:avLst/>
-          </a:prstGeom>
-          <a:ln w="22225">
-            <a:solidFill>
-              <a:schemeClr val="accent6"/>
-            </a:solidFill>
-            <a:headEnd type="triangle" w="lg" len="lg"/>
-            <a:tailEnd type="oval" w="lg" len="lg"/>
-          </a:ln>
-        </p:spPr>
-        <p:style>
-          <a:lnRef idx="1">
-            <a:schemeClr val="accent1"/>
-          </a:lnRef>
-          <a:fillRef idx="0">
-            <a:schemeClr val="accent1"/>
-          </a:fillRef>
-          <a:effectRef idx="0">
-            <a:schemeClr val="accent1"/>
-          </a:effectRef>
-          <a:fontRef idx="minor">
-            <a:schemeClr val="tx1"/>
-          </a:fontRef>
-        </p:style>
-      </p:cxnSp>
-      <p:sp>
-        <p:nvSpPr>
-          <p:cNvPr id="18" name="TextBox 17"/>
-          <p:cNvSpPr txBox="1"/>
-          <p:nvPr/>
-        </p:nvSpPr>
-        <p:spPr>
-          <a:xfrm>
-            <a:off x="4748127" y="3653813"/>
-            <a:ext cx="742254" cy="369332"/>
-          </a:xfrm>
-          <a:prstGeom prst="rect">
-            <a:avLst/>
-          </a:prstGeom>
-          <a:noFill/>
-        </p:spPr>
-        <p:txBody>
-          <a:bodyPr wrap="none" rtlCol="0">
-            <a:spAutoFit/>
-          </a:bodyPr>
-          <a:lstStyle/>
-          <a:p>
-            <a:r>
-              <a:rPr lang="en-GB" dirty="0" smtClean="0">
+        <p:cxnSp>
+          <p:nvCxnSpPr>
+            <p:cNvPr id="12" name="Straight Connector 11"/>
+            <p:cNvCxnSpPr>
+              <a:endCxn id="4" idx="3"/>
+            </p:cNvCxnSpPr>
+            <p:nvPr/>
+          </p:nvCxnSpPr>
+          <p:spPr>
+            <a:xfrm flipV="1">
+              <a:off x="4397829" y="3094439"/>
+              <a:ext cx="2350567" cy="1716984"/>
+            </a:xfrm>
+            <a:prstGeom prst="line">
+              <a:avLst/>
+            </a:prstGeom>
+            <a:ln w="22225">
+              <a:solidFill>
+                <a:schemeClr val="accent6"/>
+              </a:solidFill>
+              <a:headEnd type="triangle" w="lg" len="lg"/>
+              <a:tailEnd type="oval" w="lg" len="lg"/>
+            </a:ln>
+          </p:spPr>
+          <p:style>
+            <a:lnRef idx="1">
+              <a:schemeClr val="accent1"/>
+            </a:lnRef>
+            <a:fillRef idx="0">
+              <a:schemeClr val="accent1"/>
+            </a:fillRef>
+            <a:effectRef idx="0">
+              <a:schemeClr val="accent1"/>
+            </a:effectRef>
+            <a:fontRef idx="minor">
+              <a:schemeClr val="tx1"/>
+            </a:fontRef>
+          </p:style>
+        </p:cxnSp>
+        <p:sp>
+          <p:nvSpPr>
+            <p:cNvPr id="18" name="TextBox 17"/>
+            <p:cNvSpPr txBox="1"/>
+            <p:nvPr/>
+          </p:nvSpPr>
+          <p:spPr>
+            <a:xfrm>
+              <a:off x="4748127" y="3653813"/>
+              <a:ext cx="742254" cy="369332"/>
+            </a:xfrm>
+            <a:prstGeom prst="rect">
+              <a:avLst/>
+            </a:prstGeom>
+            <a:noFill/>
+          </p:spPr>
+          <p:txBody>
+            <a:bodyPr wrap="none" rtlCol="0">
+              <a:spAutoFit/>
+            </a:bodyPr>
+            <a:lstStyle/>
+            <a:p>
+              <a:r>
+                <a:rPr lang="en-GB" dirty="0" smtClean="0">
+                  <a:solidFill>
+                    <a:schemeClr val="accent6"/>
+                  </a:solidFill>
+                </a:rPr>
+                <a:t>R</a:t>
+              </a:r>
+              <a:r>
+                <a:rPr lang="en-GB" baseline="-25000" dirty="0" smtClean="0">
+                  <a:solidFill>
+                    <a:schemeClr val="accent6"/>
+                  </a:solidFill>
+                </a:rPr>
+                <a:t>Sphere</a:t>
+              </a:r>
+              <a:endParaRPr lang="en-GB" dirty="0">
                 <a:solidFill>
                   <a:schemeClr val="accent6"/>
                 </a:solidFill>
-              </a:rPr>
-              <a:t>R</a:t>
-            </a:r>
-            <a:r>
-              <a:rPr lang="en-GB" baseline="-25000" dirty="0" smtClean="0">
+              </a:endParaRPr>
+            </a:p>
+          </p:txBody>
+        </p:sp>
+        <p:sp>
+          <p:nvSpPr>
+            <p:cNvPr id="20" name="TextBox 19"/>
+            <p:cNvSpPr txBox="1"/>
+            <p:nvPr/>
+          </p:nvSpPr>
+          <p:spPr>
+            <a:xfrm>
+              <a:off x="7415131" y="2366200"/>
+              <a:ext cx="625492" cy="369332"/>
+            </a:xfrm>
+            <a:prstGeom prst="rect">
+              <a:avLst/>
+            </a:prstGeom>
+            <a:noFill/>
+          </p:spPr>
+          <p:txBody>
+            <a:bodyPr wrap="none" rtlCol="0">
+              <a:spAutoFit/>
+            </a:bodyPr>
+            <a:lstStyle/>
+            <a:p>
+              <a:r>
+                <a:rPr lang="en-GB" dirty="0" smtClean="0">
+                  <a:solidFill>
+                    <a:schemeClr val="accent5"/>
+                  </a:solidFill>
+                </a:rPr>
+                <a:t>Base</a:t>
+              </a:r>
+              <a:endParaRPr lang="en-GB" dirty="0">
+                <a:solidFill>
+                  <a:schemeClr val="accent5"/>
+                </a:solidFill>
+              </a:endParaRPr>
+            </a:p>
+          </p:txBody>
+        </p:sp>
+        <p:sp>
+          <p:nvSpPr>
+            <p:cNvPr id="21" name="TextBox 20"/>
+            <p:cNvSpPr txBox="1"/>
+            <p:nvPr/>
+          </p:nvSpPr>
+          <p:spPr>
+            <a:xfrm rot="1974035">
+              <a:off x="5350623" y="2156080"/>
+              <a:ext cx="582211" cy="369332"/>
+            </a:xfrm>
+            <a:prstGeom prst="rect">
+              <a:avLst/>
+            </a:prstGeom>
+            <a:noFill/>
+          </p:spPr>
+          <p:txBody>
+            <a:bodyPr wrap="none" rtlCol="0">
+              <a:spAutoFit/>
+            </a:bodyPr>
+            <a:lstStyle/>
+            <a:p>
+              <a:r>
+                <a:rPr lang="en-GB" dirty="0" smtClean="0">
+                  <a:solidFill>
+                    <a:schemeClr val="bg1"/>
+                  </a:solidFill>
+                </a:rPr>
+                <a:t>Arm</a:t>
+              </a:r>
+              <a:endParaRPr lang="en-GB" dirty="0">
+                <a:solidFill>
+                  <a:schemeClr val="bg1"/>
+                </a:solidFill>
+              </a:endParaRPr>
+            </a:p>
+          </p:txBody>
+        </p:sp>
+        <p:sp>
+          <p:nvSpPr>
+            <p:cNvPr id="30" name="TextBox 29"/>
+            <p:cNvSpPr txBox="1"/>
+            <p:nvPr/>
+          </p:nvSpPr>
+          <p:spPr>
+            <a:xfrm>
+              <a:off x="6287854" y="777728"/>
+              <a:ext cx="1269929" cy="646331"/>
+            </a:xfrm>
+            <a:prstGeom prst="rect">
+              <a:avLst/>
+            </a:prstGeom>
+            <a:noFill/>
+          </p:spPr>
+          <p:txBody>
+            <a:bodyPr wrap="square" rtlCol="0">
+              <a:spAutoFit/>
+            </a:bodyPr>
+            <a:lstStyle/>
+            <a:p>
+              <a:r>
+                <a:rPr lang="en-GB" dirty="0" smtClean="0">
+                  <a:solidFill>
+                    <a:schemeClr val="accent5"/>
+                  </a:solidFill>
+                </a:rPr>
+                <a:t>Achievable Range</a:t>
+              </a:r>
+              <a:endParaRPr lang="en-GB" dirty="0">
+                <a:solidFill>
+                  <a:schemeClr val="accent5"/>
+                </a:solidFill>
+              </a:endParaRPr>
+            </a:p>
+          </p:txBody>
+        </p:sp>
+        <p:cxnSp>
+          <p:nvCxnSpPr>
+            <p:cNvPr id="32" name="Straight Connector 31"/>
+            <p:cNvCxnSpPr>
+              <a:stCxn id="30" idx="1"/>
+            </p:cNvCxnSpPr>
+            <p:nvPr/>
+          </p:nvCxnSpPr>
+          <p:spPr>
+            <a:xfrm flipH="1" flipV="1">
+              <a:off x="5634182" y="737371"/>
+              <a:ext cx="653672" cy="363523"/>
+            </a:xfrm>
+            <a:prstGeom prst="line">
+              <a:avLst/>
+            </a:prstGeom>
+            <a:ln>
+              <a:headEnd type="none"/>
+              <a:tailEnd type="triangle" w="lg" len="med"/>
+            </a:ln>
+          </p:spPr>
+          <p:style>
+            <a:lnRef idx="1">
+              <a:schemeClr val="accent1"/>
+            </a:lnRef>
+            <a:fillRef idx="0">
+              <a:schemeClr val="accent1"/>
+            </a:fillRef>
+            <a:effectRef idx="0">
+              <a:schemeClr val="accent1"/>
+            </a:effectRef>
+            <a:fontRef idx="minor">
+              <a:schemeClr val="tx1"/>
+            </a:fontRef>
+          </p:style>
+        </p:cxnSp>
+        <p:cxnSp>
+          <p:nvCxnSpPr>
+            <p:cNvPr id="48" name="Straight Connector 47"/>
+            <p:cNvCxnSpPr/>
+            <p:nvPr/>
+          </p:nvCxnSpPr>
+          <p:spPr>
+            <a:xfrm flipH="1">
+              <a:off x="5919278" y="5052938"/>
+              <a:ext cx="405392" cy="518661"/>
+            </a:xfrm>
+            <a:prstGeom prst="line">
+              <a:avLst/>
+            </a:prstGeom>
+            <a:ln>
+              <a:headEnd type="none"/>
+              <a:tailEnd type="triangle" w="lg" len="med"/>
+            </a:ln>
+          </p:spPr>
+          <p:style>
+            <a:lnRef idx="1">
+              <a:schemeClr val="accent1"/>
+            </a:lnRef>
+            <a:fillRef idx="0">
+              <a:schemeClr val="accent1"/>
+            </a:fillRef>
+            <a:effectRef idx="0">
+              <a:schemeClr val="accent1"/>
+            </a:effectRef>
+            <a:fontRef idx="minor">
+              <a:schemeClr val="tx1"/>
+            </a:fontRef>
+          </p:style>
+        </p:cxnSp>
+        <p:sp>
+          <p:nvSpPr>
+            <p:cNvPr id="49" name="TextBox 48"/>
+            <p:cNvSpPr txBox="1"/>
+            <p:nvPr/>
+          </p:nvSpPr>
+          <p:spPr>
+            <a:xfrm>
+              <a:off x="6249009" y="4723874"/>
+              <a:ext cx="1866229" cy="646331"/>
+            </a:xfrm>
+            <a:prstGeom prst="rect">
+              <a:avLst/>
+            </a:prstGeom>
+            <a:noFill/>
+          </p:spPr>
+          <p:txBody>
+            <a:bodyPr wrap="square" rtlCol="0">
+              <a:spAutoFit/>
+            </a:bodyPr>
+            <a:lstStyle/>
+            <a:p>
+              <a:r>
+                <a:rPr lang="en-GB" dirty="0" smtClean="0">
+                  <a:solidFill>
+                    <a:schemeClr val="accent5"/>
+                  </a:solidFill>
+                </a:rPr>
+                <a:t>Not immediately disregarded</a:t>
+              </a:r>
+              <a:endParaRPr lang="en-GB" dirty="0">
+                <a:solidFill>
+                  <a:schemeClr val="accent5"/>
+                </a:solidFill>
+              </a:endParaRPr>
+            </a:p>
+          </p:txBody>
+        </p:sp>
+        <p:sp>
+          <p:nvSpPr>
+            <p:cNvPr id="51" name="TextBox 50"/>
+            <p:cNvSpPr txBox="1"/>
+            <p:nvPr/>
+          </p:nvSpPr>
+          <p:spPr>
+            <a:xfrm>
+              <a:off x="7405535" y="3261160"/>
+              <a:ext cx="984116" cy="369332"/>
+            </a:xfrm>
+            <a:prstGeom prst="rect">
+              <a:avLst/>
+            </a:prstGeom>
+            <a:noFill/>
+          </p:spPr>
+          <p:txBody>
+            <a:bodyPr wrap="none" rtlCol="0">
+              <a:spAutoFit/>
+            </a:bodyPr>
+            <a:lstStyle/>
+            <a:p>
+              <a:r>
+                <a:rPr lang="en-GB" dirty="0" smtClean="0">
+                  <a:solidFill>
+                    <a:schemeClr val="accent6"/>
+                  </a:solidFill>
+                </a:rPr>
+                <a:t>R</a:t>
+              </a:r>
+              <a:r>
+                <a:rPr lang="en-GB" baseline="-25000" dirty="0" smtClean="0">
+                  <a:solidFill>
+                    <a:schemeClr val="accent6"/>
+                  </a:solidFill>
+                </a:rPr>
+                <a:t>minSphere</a:t>
+              </a:r>
+              <a:endParaRPr lang="en-GB" dirty="0">
                 <a:solidFill>
                   <a:schemeClr val="accent6"/>
                 </a:solidFill>
-              </a:rPr>
-              <a:t>Sphere</a:t>
-            </a:r>
-            <a:endParaRPr lang="en-GB" dirty="0">
+              </a:endParaRPr>
+            </a:p>
+          </p:txBody>
+        </p:sp>
+        <p:sp>
+          <p:nvSpPr>
+            <p:cNvPr id="25" name="Rectangle 24"/>
+            <p:cNvSpPr/>
+            <p:nvPr/>
+          </p:nvSpPr>
+          <p:spPr>
+            <a:xfrm rot="18278868">
+              <a:off x="6461800" y="2892983"/>
+              <a:ext cx="1378820" cy="936736"/>
+            </a:xfrm>
+            <a:prstGeom prst="rect">
+              <a:avLst/>
+            </a:prstGeom>
+            <a:pattFill prst="wdUpDiag">
+              <a:fgClr>
+                <a:schemeClr val="accent1"/>
+              </a:fgClr>
+              <a:bgClr>
+                <a:schemeClr val="bg1"/>
+              </a:bgClr>
+            </a:pattFill>
+            <a:ln>
+              <a:noFill/>
+            </a:ln>
+          </p:spPr>
+          <p:style>
+            <a:lnRef idx="2">
+              <a:schemeClr val="accent1">
+                <a:shade val="50000"/>
+              </a:schemeClr>
+            </a:lnRef>
+            <a:fillRef idx="1">
+              <a:schemeClr val="accent1"/>
+            </a:fillRef>
+            <a:effectRef idx="0">
+              <a:schemeClr val="accent1"/>
+            </a:effectRef>
+            <a:fontRef idx="minor">
+              <a:schemeClr val="lt1"/>
+            </a:fontRef>
+          </p:style>
+          <p:txBody>
+            <a:bodyPr rtlCol="0" anchor="ctr"/>
+            <a:lstStyle/>
+            <a:p>
+              <a:pPr algn="ctr"/>
+              <a:endParaRPr lang="en-GB"/>
+            </a:p>
+          </p:txBody>
+        </p:sp>
+        <p:cxnSp>
+          <p:nvCxnSpPr>
+            <p:cNvPr id="50" name="Straight Connector 49"/>
+            <p:cNvCxnSpPr>
+              <a:endCxn id="5" idx="2"/>
+            </p:cNvCxnSpPr>
+            <p:nvPr/>
+          </p:nvCxnSpPr>
+          <p:spPr>
+            <a:xfrm flipH="1" flipV="1">
+              <a:off x="6766960" y="3090335"/>
+              <a:ext cx="2355498" cy="492708"/>
+            </a:xfrm>
+            <a:prstGeom prst="line">
+              <a:avLst/>
+            </a:prstGeom>
+            <a:ln w="22225">
               <a:solidFill>
                 <a:schemeClr val="accent6"/>
               </a:solidFill>
-            </a:endParaRPr>
-          </a:p>
-        </p:txBody>
-      </p:sp>
-      <p:sp>
-        <p:nvSpPr>
-          <p:cNvPr id="20" name="TextBox 19"/>
-          <p:cNvSpPr txBox="1"/>
-          <p:nvPr/>
-        </p:nvSpPr>
-        <p:spPr>
-          <a:xfrm>
-            <a:off x="7415131" y="2366200"/>
-            <a:ext cx="625492" cy="369332"/>
-          </a:xfrm>
-          <a:prstGeom prst="rect">
-            <a:avLst/>
-          </a:prstGeom>
-          <a:noFill/>
-        </p:spPr>
-        <p:txBody>
-          <a:bodyPr wrap="none" rtlCol="0">
-            <a:spAutoFit/>
-          </a:bodyPr>
-          <a:lstStyle/>
-          <a:p>
-            <a:r>
-              <a:rPr lang="en-GB" dirty="0" smtClean="0">
-                <a:solidFill>
-                  <a:schemeClr val="accent5"/>
-                </a:solidFill>
-              </a:rPr>
-              <a:t>Base</a:t>
-            </a:r>
-            <a:endParaRPr lang="en-GB" dirty="0">
-              <a:solidFill>
-                <a:schemeClr val="accent5"/>
-              </a:solidFill>
-            </a:endParaRPr>
-          </a:p>
-        </p:txBody>
-      </p:sp>
-      <p:sp>
-        <p:nvSpPr>
-          <p:cNvPr id="21" name="TextBox 20"/>
-          <p:cNvSpPr txBox="1"/>
-          <p:nvPr/>
-        </p:nvSpPr>
-        <p:spPr>
-          <a:xfrm rot="1974035">
-            <a:off x="5350623" y="2156080"/>
-            <a:ext cx="582211" cy="369332"/>
-          </a:xfrm>
-          <a:prstGeom prst="rect">
-            <a:avLst/>
-          </a:prstGeom>
-          <a:noFill/>
-        </p:spPr>
-        <p:txBody>
-          <a:bodyPr wrap="none" rtlCol="0">
-            <a:spAutoFit/>
-          </a:bodyPr>
-          <a:lstStyle/>
-          <a:p>
-            <a:r>
-              <a:rPr lang="en-GB" dirty="0" smtClean="0">
-                <a:solidFill>
-                  <a:schemeClr val="bg1"/>
-                </a:solidFill>
-              </a:rPr>
-              <a:t>Arm</a:t>
-            </a:r>
-            <a:endParaRPr lang="en-GB" dirty="0">
-              <a:solidFill>
-                <a:schemeClr val="bg1"/>
-              </a:solidFill>
-            </a:endParaRPr>
-          </a:p>
-        </p:txBody>
-      </p:sp>
-      <p:sp>
-        <p:nvSpPr>
-          <p:cNvPr id="30" name="TextBox 29"/>
-          <p:cNvSpPr txBox="1"/>
-          <p:nvPr/>
-        </p:nvSpPr>
-        <p:spPr>
-          <a:xfrm>
-            <a:off x="6287854" y="777728"/>
-            <a:ext cx="1269929" cy="646331"/>
-          </a:xfrm>
-          <a:prstGeom prst="rect">
-            <a:avLst/>
-          </a:prstGeom>
-          <a:noFill/>
-        </p:spPr>
-        <p:txBody>
-          <a:bodyPr wrap="square" rtlCol="0">
-            <a:spAutoFit/>
-          </a:bodyPr>
-          <a:lstStyle/>
-          <a:p>
-            <a:r>
-              <a:rPr lang="en-GB" dirty="0" smtClean="0">
-                <a:solidFill>
-                  <a:schemeClr val="accent5"/>
-                </a:solidFill>
-              </a:rPr>
-              <a:t>Achievable Range</a:t>
-            </a:r>
-            <a:endParaRPr lang="en-GB" dirty="0">
-              <a:solidFill>
-                <a:schemeClr val="accent5"/>
-              </a:solidFill>
-            </a:endParaRPr>
-          </a:p>
-        </p:txBody>
-      </p:sp>
-      <p:cxnSp>
-        <p:nvCxnSpPr>
-          <p:cNvPr id="32" name="Straight Connector 31"/>
-          <p:cNvCxnSpPr>
-            <a:stCxn id="30" idx="1"/>
-          </p:cNvCxnSpPr>
-          <p:nvPr/>
-        </p:nvCxnSpPr>
-        <p:spPr>
-          <a:xfrm flipH="1" flipV="1">
-            <a:off x="5634182" y="737371"/>
-            <a:ext cx="653672" cy="363523"/>
-          </a:xfrm>
-          <a:prstGeom prst="line">
-            <a:avLst/>
-          </a:prstGeom>
-          <a:ln>
-            <a:headEnd type="none"/>
-            <a:tailEnd type="triangle" w="lg" len="med"/>
-          </a:ln>
-        </p:spPr>
-        <p:style>
-          <a:lnRef idx="1">
-            <a:schemeClr val="accent1"/>
-          </a:lnRef>
-          <a:fillRef idx="0">
-            <a:schemeClr val="accent1"/>
-          </a:fillRef>
-          <a:effectRef idx="0">
-            <a:schemeClr val="accent1"/>
-          </a:effectRef>
-          <a:fontRef idx="minor">
-            <a:schemeClr val="tx1"/>
-          </a:fontRef>
-        </p:style>
-      </p:cxnSp>
-      <p:cxnSp>
-        <p:nvCxnSpPr>
-          <p:cNvPr id="48" name="Straight Connector 47"/>
-          <p:cNvCxnSpPr/>
-          <p:nvPr/>
-        </p:nvCxnSpPr>
-        <p:spPr>
-          <a:xfrm flipH="1">
-            <a:off x="5919278" y="5052938"/>
-            <a:ext cx="405392" cy="518661"/>
-          </a:xfrm>
-          <a:prstGeom prst="line">
-            <a:avLst/>
-          </a:prstGeom>
-          <a:ln>
-            <a:headEnd type="none"/>
-            <a:tailEnd type="triangle" w="lg" len="med"/>
-          </a:ln>
-        </p:spPr>
-        <p:style>
-          <a:lnRef idx="1">
-            <a:schemeClr val="accent1"/>
-          </a:lnRef>
-          <a:fillRef idx="0">
-            <a:schemeClr val="accent1"/>
-          </a:fillRef>
-          <a:effectRef idx="0">
-            <a:schemeClr val="accent1"/>
-          </a:effectRef>
-          <a:fontRef idx="minor">
-            <a:schemeClr val="tx1"/>
-          </a:fontRef>
-        </p:style>
-      </p:cxnSp>
-      <p:sp>
-        <p:nvSpPr>
-          <p:cNvPr id="49" name="TextBox 48"/>
-          <p:cNvSpPr txBox="1"/>
-          <p:nvPr/>
-        </p:nvSpPr>
-        <p:spPr>
-          <a:xfrm>
-            <a:off x="6249009" y="4723874"/>
-            <a:ext cx="1866229" cy="646331"/>
-          </a:xfrm>
-          <a:prstGeom prst="rect">
-            <a:avLst/>
-          </a:prstGeom>
-          <a:noFill/>
-        </p:spPr>
-        <p:txBody>
-          <a:bodyPr wrap="square" rtlCol="0">
-            <a:spAutoFit/>
-          </a:bodyPr>
-          <a:lstStyle/>
-          <a:p>
-            <a:r>
-              <a:rPr lang="en-GB" dirty="0" smtClean="0">
-                <a:solidFill>
-                  <a:schemeClr val="accent5"/>
-                </a:solidFill>
-              </a:rPr>
-              <a:t>Not immediately disregarded</a:t>
-            </a:r>
-            <a:endParaRPr lang="en-GB" dirty="0">
-              <a:solidFill>
-                <a:schemeClr val="accent5"/>
-              </a:solidFill>
-            </a:endParaRPr>
-          </a:p>
-        </p:txBody>
-      </p:sp>
-      <p:cxnSp>
-        <p:nvCxnSpPr>
-          <p:cNvPr id="50" name="Straight Connector 49"/>
-          <p:cNvCxnSpPr>
-            <a:endCxn id="5" idx="2"/>
-          </p:cNvCxnSpPr>
-          <p:nvPr/>
-        </p:nvCxnSpPr>
-        <p:spPr>
-          <a:xfrm flipH="1" flipV="1">
-            <a:off x="6766960" y="3090335"/>
-            <a:ext cx="2355498" cy="492708"/>
-          </a:xfrm>
-          <a:prstGeom prst="line">
-            <a:avLst/>
-          </a:prstGeom>
-          <a:ln w="22225">
-            <a:solidFill>
-              <a:schemeClr val="accent6"/>
-            </a:solidFill>
-            <a:headEnd type="triangle" w="lg" len="lg"/>
-            <a:tailEnd type="none" w="lg" len="lg"/>
-          </a:ln>
-        </p:spPr>
-        <p:style>
-          <a:lnRef idx="1">
-            <a:schemeClr val="accent1"/>
-          </a:lnRef>
-          <a:fillRef idx="0">
-            <a:schemeClr val="accent1"/>
-          </a:fillRef>
-          <a:effectRef idx="0">
-            <a:schemeClr val="accent1"/>
-          </a:effectRef>
-          <a:fontRef idx="minor">
-            <a:schemeClr val="tx1"/>
-          </a:fontRef>
-        </p:style>
-      </p:cxnSp>
-      <p:sp>
-        <p:nvSpPr>
-          <p:cNvPr id="51" name="TextBox 50"/>
-          <p:cNvSpPr txBox="1"/>
-          <p:nvPr/>
-        </p:nvSpPr>
-        <p:spPr>
-          <a:xfrm>
-            <a:off x="7405535" y="3261160"/>
-            <a:ext cx="984116" cy="369332"/>
-          </a:xfrm>
-          <a:prstGeom prst="rect">
-            <a:avLst/>
-          </a:prstGeom>
-          <a:noFill/>
-        </p:spPr>
-        <p:txBody>
-          <a:bodyPr wrap="none" rtlCol="0">
-            <a:spAutoFit/>
-          </a:bodyPr>
-          <a:lstStyle/>
-          <a:p>
-            <a:r>
-              <a:rPr lang="en-GB" dirty="0" smtClean="0">
-                <a:solidFill>
-                  <a:schemeClr val="accent6"/>
-                </a:solidFill>
-              </a:rPr>
-              <a:t>R</a:t>
-            </a:r>
-            <a:r>
-              <a:rPr lang="en-GB" baseline="-25000" dirty="0" smtClean="0">
-                <a:solidFill>
-                  <a:schemeClr val="accent6"/>
-                </a:solidFill>
-              </a:rPr>
-              <a:t>minSphere</a:t>
-            </a:r>
-            <a:endParaRPr lang="en-GB" dirty="0">
-              <a:solidFill>
-                <a:schemeClr val="accent6"/>
-              </a:solidFill>
-            </a:endParaRPr>
-          </a:p>
-        </p:txBody>
-      </p:sp>
+              <a:headEnd type="triangle" w="lg" len="lg"/>
+              <a:tailEnd type="none" w="lg" len="lg"/>
+            </a:ln>
+          </p:spPr>
+          <p:style>
+            <a:lnRef idx="1">
+              <a:schemeClr val="accent1"/>
+            </a:lnRef>
+            <a:fillRef idx="0">
+              <a:schemeClr val="accent1"/>
+            </a:fillRef>
+            <a:effectRef idx="0">
+              <a:schemeClr val="accent1"/>
+            </a:effectRef>
+            <a:fontRef idx="minor">
+              <a:schemeClr val="tx1"/>
+            </a:fontRef>
+          </p:style>
+        </p:cxnSp>
+      </p:grpSp>
     </p:spTree>
     <p:extLst>
       <p:ext uri="{BB962C8B-B14F-4D97-AF65-F5344CB8AC3E}">

</xml_diff>